<commit_message>
updated hint to availability
</commit_message>
<xml_diff>
--- a/mdt/ocl/docs/publications/TUIlmenau2011ImpactAnalysis/OCL Impact Analysis.pptx
+++ b/mdt/ocl/docs/publications/TUIlmenau2011ImpactAnalysis/OCL Impact Analysis.pptx
@@ -3380,14 +3380,14 @@
           <a:effectLst/>
           <a:extLst>
             <a:ext uri="{909E8E84-426E-40DD-AFC4-6F175D3DCCD1}">
-              <a14:hiddenFill xmlns:a14="http://schemas.microsoft.com/office/drawing/2010/main" xmlns="">
+              <a14:hiddenFill xmlns="" xmlns:a14="http://schemas.microsoft.com/office/drawing/2010/main">
                 <a:solidFill>
                   <a:schemeClr val="accent1"/>
                 </a:solidFill>
               </a14:hiddenFill>
             </a:ext>
             <a:ext uri="{91240B29-F687-4F45-9708-019B960494DF}">
-              <a14:hiddenLine xmlns:a14="http://schemas.microsoft.com/office/drawing/2010/main" xmlns="" w="9525">
+              <a14:hiddenLine xmlns="" xmlns:a14="http://schemas.microsoft.com/office/drawing/2010/main" w="9525">
                 <a:solidFill>
                   <a:schemeClr val="tx1"/>
                 </a:solidFill>
@@ -3397,7 +3397,7 @@
               </a14:hiddenLine>
             </a:ext>
             <a:ext uri="{AF507438-7753-43E0-B8FC-AC1667EBCBE1}">
-              <a14:hiddenEffects xmlns:a14="http://schemas.microsoft.com/office/drawing/2010/main" xmlns="">
+              <a14:hiddenEffects xmlns="" xmlns:a14="http://schemas.microsoft.com/office/drawing/2010/main">
                 <a:effectLst>
                   <a:outerShdw dist="35921" dir="2700000" algn="ctr" rotWithShape="0">
                     <a:schemeClr val="bg2"/>
@@ -3462,14 +3462,14 @@
           <a:effectLst/>
           <a:extLst>
             <a:ext uri="{909E8E84-426E-40DD-AFC4-6F175D3DCCD1}">
-              <a14:hiddenFill xmlns:a14="http://schemas.microsoft.com/office/drawing/2010/main" xmlns="">
+              <a14:hiddenFill xmlns="" xmlns:a14="http://schemas.microsoft.com/office/drawing/2010/main">
                 <a:solidFill>
                   <a:schemeClr val="accent1"/>
                 </a:solidFill>
               </a14:hiddenFill>
             </a:ext>
             <a:ext uri="{91240B29-F687-4F45-9708-019B960494DF}">
-              <a14:hiddenLine xmlns:a14="http://schemas.microsoft.com/office/drawing/2010/main" xmlns="" w="9525">
+              <a14:hiddenLine xmlns="" xmlns:a14="http://schemas.microsoft.com/office/drawing/2010/main" w="9525">
                 <a:solidFill>
                   <a:schemeClr val="tx1"/>
                 </a:solidFill>
@@ -3479,7 +3479,7 @@
               </a14:hiddenLine>
             </a:ext>
             <a:ext uri="{AF507438-7753-43E0-B8FC-AC1667EBCBE1}">
-              <a14:hiddenEffects xmlns:a14="http://schemas.microsoft.com/office/drawing/2010/main" xmlns="">
+              <a14:hiddenEffects xmlns="" xmlns:a14="http://schemas.microsoft.com/office/drawing/2010/main">
                 <a:effectLst>
                   <a:outerShdw dist="35921" dir="2700000" algn="ctr" rotWithShape="0">
                     <a:schemeClr val="bg2"/>
@@ -3544,14 +3544,14 @@
           <a:effectLst/>
           <a:extLst>
             <a:ext uri="{909E8E84-426E-40DD-AFC4-6F175D3DCCD1}">
-              <a14:hiddenFill xmlns:a14="http://schemas.microsoft.com/office/drawing/2010/main" xmlns="">
+              <a14:hiddenFill xmlns="" xmlns:a14="http://schemas.microsoft.com/office/drawing/2010/main">
                 <a:solidFill>
                   <a:schemeClr val="accent1"/>
                 </a:solidFill>
               </a14:hiddenFill>
             </a:ext>
             <a:ext uri="{91240B29-F687-4F45-9708-019B960494DF}">
-              <a14:hiddenLine xmlns:a14="http://schemas.microsoft.com/office/drawing/2010/main" xmlns="" w="9525">
+              <a14:hiddenLine xmlns="" xmlns:a14="http://schemas.microsoft.com/office/drawing/2010/main" w="9525">
                 <a:solidFill>
                   <a:schemeClr val="tx1"/>
                 </a:solidFill>
@@ -3561,7 +3561,7 @@
               </a14:hiddenLine>
             </a:ext>
             <a:ext uri="{AF507438-7753-43E0-B8FC-AC1667EBCBE1}">
-              <a14:hiddenEffects xmlns:a14="http://schemas.microsoft.com/office/drawing/2010/main" xmlns="">
+              <a14:hiddenEffects xmlns="" xmlns:a14="http://schemas.microsoft.com/office/drawing/2010/main">
                 <a:effectLst>
                   <a:outerShdw dist="35921" dir="2700000" algn="ctr" rotWithShape="0">
                     <a:schemeClr val="bg2"/>
@@ -3626,14 +3626,14 @@
           <a:effectLst/>
           <a:extLst>
             <a:ext uri="{909E8E84-426E-40DD-AFC4-6F175D3DCCD1}">
-              <a14:hiddenFill xmlns:a14="http://schemas.microsoft.com/office/drawing/2010/main" xmlns="">
+              <a14:hiddenFill xmlns="" xmlns:a14="http://schemas.microsoft.com/office/drawing/2010/main">
                 <a:solidFill>
                   <a:schemeClr val="accent1"/>
                 </a:solidFill>
               </a14:hiddenFill>
             </a:ext>
             <a:ext uri="{91240B29-F687-4F45-9708-019B960494DF}">
-              <a14:hiddenLine xmlns:a14="http://schemas.microsoft.com/office/drawing/2010/main" xmlns="" w="9525">
+              <a14:hiddenLine xmlns="" xmlns:a14="http://schemas.microsoft.com/office/drawing/2010/main" w="9525">
                 <a:solidFill>
                   <a:schemeClr val="tx1"/>
                 </a:solidFill>
@@ -3643,7 +3643,7 @@
               </a14:hiddenLine>
             </a:ext>
             <a:ext uri="{AF507438-7753-43E0-B8FC-AC1667EBCBE1}">
-              <a14:hiddenEffects xmlns:a14="http://schemas.microsoft.com/office/drawing/2010/main" xmlns="">
+              <a14:hiddenEffects xmlns="" xmlns:a14="http://schemas.microsoft.com/office/drawing/2010/main">
                 <a:effectLst>
                   <a:outerShdw dist="35921" dir="2700000" algn="ctr" rotWithShape="0">
                     <a:schemeClr val="bg2"/>
@@ -3693,7 +3693,7 @@
     </p:spTree>
     <p:extLst>
       <p:ext uri="{BB962C8B-B14F-4D97-AF65-F5344CB8AC3E}">
-        <p14:creationId xmlns:p14="http://schemas.microsoft.com/office/powerpoint/2010/main" xmlns="" val="2802200125"/>
+        <p14:creationId xmlns="" xmlns:p14="http://schemas.microsoft.com/office/powerpoint/2010/main" val="2802200125"/>
       </p:ext>
     </p:extLst>
   </p:cSld>
@@ -3751,14 +3751,14 @@
           <a:effectLst/>
           <a:extLst>
             <a:ext uri="{909E8E84-426E-40DD-AFC4-6F175D3DCCD1}">
-              <a14:hiddenFill xmlns:a14="http://schemas.microsoft.com/office/drawing/2010/main" xmlns="">
+              <a14:hiddenFill xmlns="" xmlns:a14="http://schemas.microsoft.com/office/drawing/2010/main">
                 <a:solidFill>
                   <a:schemeClr val="accent1"/>
                 </a:solidFill>
               </a14:hiddenFill>
             </a:ext>
             <a:ext uri="{91240B29-F687-4F45-9708-019B960494DF}">
-              <a14:hiddenLine xmlns:a14="http://schemas.microsoft.com/office/drawing/2010/main" xmlns="" w="9525">
+              <a14:hiddenLine xmlns="" xmlns:a14="http://schemas.microsoft.com/office/drawing/2010/main" w="9525">
                 <a:solidFill>
                   <a:schemeClr val="tx1"/>
                 </a:solidFill>
@@ -3768,7 +3768,7 @@
               </a14:hiddenLine>
             </a:ext>
             <a:ext uri="{AF507438-7753-43E0-B8FC-AC1667EBCBE1}">
-              <a14:hiddenEffects xmlns:a14="http://schemas.microsoft.com/office/drawing/2010/main" xmlns="">
+              <a14:hiddenEffects xmlns="" xmlns:a14="http://schemas.microsoft.com/office/drawing/2010/main">
                 <a:effectLst>
                   <a:outerShdw dist="35921" dir="2700000" algn="ctr" rotWithShape="0">
                     <a:schemeClr val="bg2"/>
@@ -3833,14 +3833,14 @@
           <a:effectLst/>
           <a:extLst>
             <a:ext uri="{909E8E84-426E-40DD-AFC4-6F175D3DCCD1}">
-              <a14:hiddenFill xmlns:a14="http://schemas.microsoft.com/office/drawing/2010/main" xmlns="">
+              <a14:hiddenFill xmlns="" xmlns:a14="http://schemas.microsoft.com/office/drawing/2010/main">
                 <a:solidFill>
                   <a:schemeClr val="accent1"/>
                 </a:solidFill>
               </a14:hiddenFill>
             </a:ext>
             <a:ext uri="{91240B29-F687-4F45-9708-019B960494DF}">
-              <a14:hiddenLine xmlns:a14="http://schemas.microsoft.com/office/drawing/2010/main" xmlns="" w="9525">
+              <a14:hiddenLine xmlns="" xmlns:a14="http://schemas.microsoft.com/office/drawing/2010/main" w="9525">
                 <a:solidFill>
                   <a:schemeClr val="tx1"/>
                 </a:solidFill>
@@ -3850,7 +3850,7 @@
               </a14:hiddenLine>
             </a:ext>
             <a:ext uri="{AF507438-7753-43E0-B8FC-AC1667EBCBE1}">
-              <a14:hiddenEffects xmlns:a14="http://schemas.microsoft.com/office/drawing/2010/main" xmlns="">
+              <a14:hiddenEffects xmlns="" xmlns:a14="http://schemas.microsoft.com/office/drawing/2010/main">
                 <a:effectLst>
                   <a:outerShdw dist="35921" dir="2700000" algn="ctr" rotWithShape="0">
                     <a:schemeClr val="bg2"/>
@@ -3920,14 +3920,14 @@
           <a:effectLst/>
           <a:extLst>
             <a:ext uri="{909E8E84-426E-40DD-AFC4-6F175D3DCCD1}">
-              <a14:hiddenFill xmlns:a14="http://schemas.microsoft.com/office/drawing/2010/main" xmlns="">
+              <a14:hiddenFill xmlns="" xmlns:a14="http://schemas.microsoft.com/office/drawing/2010/main">
                 <a:solidFill>
                   <a:srgbClr val="FFFFFF"/>
                 </a:solidFill>
               </a14:hiddenFill>
             </a:ext>
             <a:ext uri="{AF507438-7753-43E0-B8FC-AC1667EBCBE1}">
-              <a14:hiddenEffects xmlns:a14="http://schemas.microsoft.com/office/drawing/2010/main" xmlns="">
+              <a14:hiddenEffects xmlns="" xmlns:a14="http://schemas.microsoft.com/office/drawing/2010/main">
                 <a:effectLst>
                   <a:outerShdw dist="35921" dir="2700000" algn="ctr" rotWithShape="0">
                     <a:srgbClr val="808080"/>
@@ -3936,7 +3936,7 @@
               </a14:hiddenEffects>
             </a:ext>
             <a:ext uri="{53640926-AAD7-44D8-BBD7-CCE9431645EC}">
-              <a14:shadowObscured xmlns:a14="http://schemas.microsoft.com/office/drawing/2010/main" xmlns="" val="1"/>
+              <a14:shadowObscured xmlns="" xmlns:a14="http://schemas.microsoft.com/office/drawing/2010/main" val="1"/>
             </a:ext>
           </a:extLst>
         </p:spPr>
@@ -3966,14 +3966,14 @@
           <a:effectLst/>
           <a:extLst>
             <a:ext uri="{909E8E84-426E-40DD-AFC4-6F175D3DCCD1}">
-              <a14:hiddenFill xmlns:a14="http://schemas.microsoft.com/office/drawing/2010/main" xmlns="">
+              <a14:hiddenFill xmlns="" xmlns:a14="http://schemas.microsoft.com/office/drawing/2010/main">
                 <a:solidFill>
                   <a:schemeClr val="accent1"/>
                 </a:solidFill>
               </a14:hiddenFill>
             </a:ext>
             <a:ext uri="{91240B29-F687-4F45-9708-019B960494DF}">
-              <a14:hiddenLine xmlns:a14="http://schemas.microsoft.com/office/drawing/2010/main" xmlns="" w="9525">
+              <a14:hiddenLine xmlns="" xmlns:a14="http://schemas.microsoft.com/office/drawing/2010/main" w="9525">
                 <a:solidFill>
                   <a:schemeClr val="tx1"/>
                 </a:solidFill>
@@ -3983,7 +3983,7 @@
               </a14:hiddenLine>
             </a:ext>
             <a:ext uri="{AF507438-7753-43E0-B8FC-AC1667EBCBE1}">
-              <a14:hiddenEffects xmlns:a14="http://schemas.microsoft.com/office/drawing/2010/main" xmlns="">
+              <a14:hiddenEffects xmlns="" xmlns:a14="http://schemas.microsoft.com/office/drawing/2010/main">
                 <a:effectLst>
                   <a:outerShdw dist="35921" dir="2700000" algn="ctr" rotWithShape="0">
                     <a:schemeClr val="bg2"/>
@@ -4062,14 +4062,14 @@
           <a:effectLst/>
           <a:extLst>
             <a:ext uri="{909E8E84-426E-40DD-AFC4-6F175D3DCCD1}">
-              <a14:hiddenFill xmlns:a14="http://schemas.microsoft.com/office/drawing/2010/main" xmlns="">
+              <a14:hiddenFill xmlns="" xmlns:a14="http://schemas.microsoft.com/office/drawing/2010/main">
                 <a:solidFill>
                   <a:schemeClr val="accent1"/>
                 </a:solidFill>
               </a14:hiddenFill>
             </a:ext>
             <a:ext uri="{91240B29-F687-4F45-9708-019B960494DF}">
-              <a14:hiddenLine xmlns:a14="http://schemas.microsoft.com/office/drawing/2010/main" xmlns="" w="9525">
+              <a14:hiddenLine xmlns="" xmlns:a14="http://schemas.microsoft.com/office/drawing/2010/main" w="9525">
                 <a:solidFill>
                   <a:schemeClr val="tx1"/>
                 </a:solidFill>
@@ -4079,7 +4079,7 @@
               </a14:hiddenLine>
             </a:ext>
             <a:ext uri="{AF507438-7753-43E0-B8FC-AC1667EBCBE1}">
-              <a14:hiddenEffects xmlns:a14="http://schemas.microsoft.com/office/drawing/2010/main" xmlns="">
+              <a14:hiddenEffects xmlns="" xmlns:a14="http://schemas.microsoft.com/office/drawing/2010/main">
                 <a:effectLst>
                   <a:outerShdw dist="35921" dir="2700000" algn="ctr" rotWithShape="0">
                     <a:schemeClr val="bg2"/>
@@ -4144,14 +4144,14 @@
           <a:effectLst/>
           <a:extLst>
             <a:ext uri="{909E8E84-426E-40DD-AFC4-6F175D3DCCD1}">
-              <a14:hiddenFill xmlns:a14="http://schemas.microsoft.com/office/drawing/2010/main" xmlns="">
+              <a14:hiddenFill xmlns="" xmlns:a14="http://schemas.microsoft.com/office/drawing/2010/main">
                 <a:solidFill>
                   <a:schemeClr val="accent1"/>
                 </a:solidFill>
               </a14:hiddenFill>
             </a:ext>
             <a:ext uri="{91240B29-F687-4F45-9708-019B960494DF}">
-              <a14:hiddenLine xmlns:a14="http://schemas.microsoft.com/office/drawing/2010/main" xmlns="" w="9525">
+              <a14:hiddenLine xmlns="" xmlns:a14="http://schemas.microsoft.com/office/drawing/2010/main" w="9525">
                 <a:solidFill>
                   <a:schemeClr val="tx1"/>
                 </a:solidFill>
@@ -4161,7 +4161,7 @@
               </a14:hiddenLine>
             </a:ext>
             <a:ext uri="{AF507438-7753-43E0-B8FC-AC1667EBCBE1}">
-              <a14:hiddenEffects xmlns:a14="http://schemas.microsoft.com/office/drawing/2010/main" xmlns="">
+              <a14:hiddenEffects xmlns="" xmlns:a14="http://schemas.microsoft.com/office/drawing/2010/main">
                 <a:effectLst>
                   <a:outerShdw dist="35921" dir="2700000" algn="ctr" rotWithShape="0">
                     <a:schemeClr val="bg2"/>
@@ -4211,7 +4211,7 @@
     </p:spTree>
     <p:extLst>
       <p:ext uri="{BB962C8B-B14F-4D97-AF65-F5344CB8AC3E}">
-        <p14:creationId xmlns:p14="http://schemas.microsoft.com/office/powerpoint/2010/main" xmlns="" val="41286324"/>
+        <p14:creationId xmlns="" xmlns:p14="http://schemas.microsoft.com/office/powerpoint/2010/main" val="41286324"/>
       </p:ext>
     </p:extLst>
   </p:cSld>
@@ -4870,7 +4870,7 @@
     </p:spTree>
     <p:extLst>
       <p:ext uri="{BB962C8B-B14F-4D97-AF65-F5344CB8AC3E}">
-        <p14:creationId xmlns:p14="http://schemas.microsoft.com/office/powerpoint/2010/main" xmlns="" val="2749629121"/>
+        <p14:creationId xmlns="" xmlns:p14="http://schemas.microsoft.com/office/powerpoint/2010/main" val="2749629121"/>
       </p:ext>
     </p:extLst>
   </p:cSld>
@@ -4922,7 +4922,7 @@
           <a:effectLst/>
           <a:extLst>
             <a:ext uri="{91240B29-F687-4F45-9708-019B960494DF}">
-              <a14:hiddenLine xmlns:a14="http://schemas.microsoft.com/office/drawing/2010/main" xmlns="" w="9525">
+              <a14:hiddenLine xmlns="" xmlns:a14="http://schemas.microsoft.com/office/drawing/2010/main" w="9525">
                 <a:solidFill>
                   <a:schemeClr val="tx1"/>
                 </a:solidFill>
@@ -4932,7 +4932,7 @@
               </a14:hiddenLine>
             </a:ext>
             <a:ext uri="{AF507438-7753-43E0-B8FC-AC1667EBCBE1}">
-              <a14:hiddenEffects xmlns:a14="http://schemas.microsoft.com/office/drawing/2010/main" xmlns="">
+              <a14:hiddenEffects xmlns="" xmlns:a14="http://schemas.microsoft.com/office/drawing/2010/main">
                 <a:effectLst>
                   <a:outerShdw dist="35921" dir="2700000" algn="ctr" rotWithShape="0">
                     <a:schemeClr val="bg2"/>
@@ -4995,14 +4995,14 @@
             <a:effectLst/>
             <a:extLst>
               <a:ext uri="{909E8E84-426E-40DD-AFC4-6F175D3DCCD1}">
-                <a14:hiddenFill xmlns:a14="http://schemas.microsoft.com/office/drawing/2010/main" xmlns="">
+                <a14:hiddenFill xmlns="" xmlns:a14="http://schemas.microsoft.com/office/drawing/2010/main">
                   <a:solidFill>
                     <a:srgbClr val="D8E0E5"/>
                   </a:solidFill>
                 </a14:hiddenFill>
               </a:ext>
               <a:ext uri="{AF507438-7753-43E0-B8FC-AC1667EBCBE1}">
-                <a14:hiddenEffects xmlns:a14="http://schemas.microsoft.com/office/drawing/2010/main" xmlns="">
+                <a14:hiddenEffects xmlns="" xmlns:a14="http://schemas.microsoft.com/office/drawing/2010/main">
                   <a:effectLst>
                     <a:outerShdw dist="35921" dir="2700000" algn="ctr" rotWithShape="0">
                       <a:schemeClr val="bg2"/>
@@ -5062,12 +5062,12 @@
             <a:effectLst/>
             <a:extLst>
               <a:ext uri="{909E8E84-426E-40DD-AFC4-6F175D3DCCD1}">
-                <a14:hiddenFill xmlns:a14="http://schemas.microsoft.com/office/drawing/2010/main" xmlns="">
+                <a14:hiddenFill xmlns="" xmlns:a14="http://schemas.microsoft.com/office/drawing/2010/main">
                   <a:noFill/>
                 </a14:hiddenFill>
               </a:ext>
               <a:ext uri="{AF507438-7753-43E0-B8FC-AC1667EBCBE1}">
-                <a14:hiddenEffects xmlns:a14="http://schemas.microsoft.com/office/drawing/2010/main" xmlns="">
+                <a14:hiddenEffects xmlns="" xmlns:a14="http://schemas.microsoft.com/office/drawing/2010/main">
                   <a:effectLst>
                     <a:outerShdw dist="35921" dir="2700000" algn="ctr" rotWithShape="0">
                       <a:schemeClr val="bg2"/>
@@ -5114,12 +5114,12 @@
             <a:effectLst/>
             <a:extLst>
               <a:ext uri="{909E8E84-426E-40DD-AFC4-6F175D3DCCD1}">
-                <a14:hiddenFill xmlns:a14="http://schemas.microsoft.com/office/drawing/2010/main" xmlns="">
+                <a14:hiddenFill xmlns="" xmlns:a14="http://schemas.microsoft.com/office/drawing/2010/main">
                   <a:noFill/>
                 </a14:hiddenFill>
               </a:ext>
               <a:ext uri="{AF507438-7753-43E0-B8FC-AC1667EBCBE1}">
-                <a14:hiddenEffects xmlns:a14="http://schemas.microsoft.com/office/drawing/2010/main" xmlns="">
+                <a14:hiddenEffects xmlns="" xmlns:a14="http://schemas.microsoft.com/office/drawing/2010/main">
                   <a:effectLst>
                     <a:outerShdw dist="35921" dir="2700000" algn="ctr" rotWithShape="0">
                       <a:schemeClr val="bg2"/>
@@ -5166,12 +5166,12 @@
             <a:effectLst/>
             <a:extLst>
               <a:ext uri="{909E8E84-426E-40DD-AFC4-6F175D3DCCD1}">
-                <a14:hiddenFill xmlns:a14="http://schemas.microsoft.com/office/drawing/2010/main" xmlns="">
+                <a14:hiddenFill xmlns="" xmlns:a14="http://schemas.microsoft.com/office/drawing/2010/main">
                   <a:noFill/>
                 </a14:hiddenFill>
               </a:ext>
               <a:ext uri="{AF507438-7753-43E0-B8FC-AC1667EBCBE1}">
-                <a14:hiddenEffects xmlns:a14="http://schemas.microsoft.com/office/drawing/2010/main" xmlns="">
+                <a14:hiddenEffects xmlns="" xmlns:a14="http://schemas.microsoft.com/office/drawing/2010/main">
                   <a:effectLst>
                     <a:outerShdw dist="35921" dir="2700000" algn="ctr" rotWithShape="0">
                       <a:schemeClr val="bg2"/>
@@ -5218,12 +5218,12 @@
             <a:effectLst/>
             <a:extLst>
               <a:ext uri="{909E8E84-426E-40DD-AFC4-6F175D3DCCD1}">
-                <a14:hiddenFill xmlns:a14="http://schemas.microsoft.com/office/drawing/2010/main" xmlns="">
+                <a14:hiddenFill xmlns="" xmlns:a14="http://schemas.microsoft.com/office/drawing/2010/main">
                   <a:noFill/>
                 </a14:hiddenFill>
               </a:ext>
               <a:ext uri="{AF507438-7753-43E0-B8FC-AC1667EBCBE1}">
-                <a14:hiddenEffects xmlns:a14="http://schemas.microsoft.com/office/drawing/2010/main" xmlns="">
+                <a14:hiddenEffects xmlns="" xmlns:a14="http://schemas.microsoft.com/office/drawing/2010/main">
                   <a:effectLst>
                     <a:outerShdw dist="35921" dir="2700000" algn="ctr" rotWithShape="0">
                       <a:schemeClr val="bg2"/>
@@ -5270,12 +5270,12 @@
             <a:effectLst/>
             <a:extLst>
               <a:ext uri="{909E8E84-426E-40DD-AFC4-6F175D3DCCD1}">
-                <a14:hiddenFill xmlns:a14="http://schemas.microsoft.com/office/drawing/2010/main" xmlns="">
+                <a14:hiddenFill xmlns="" xmlns:a14="http://schemas.microsoft.com/office/drawing/2010/main">
                   <a:noFill/>
                 </a14:hiddenFill>
               </a:ext>
               <a:ext uri="{AF507438-7753-43E0-B8FC-AC1667EBCBE1}">
-                <a14:hiddenEffects xmlns:a14="http://schemas.microsoft.com/office/drawing/2010/main" xmlns="">
+                <a14:hiddenEffects xmlns="" xmlns:a14="http://schemas.microsoft.com/office/drawing/2010/main">
                   <a:effectLst>
                     <a:outerShdw dist="35921" dir="2700000" algn="ctr" rotWithShape="0">
                       <a:schemeClr val="bg2"/>
@@ -5322,12 +5322,12 @@
             <a:effectLst/>
             <a:extLst>
               <a:ext uri="{909E8E84-426E-40DD-AFC4-6F175D3DCCD1}">
-                <a14:hiddenFill xmlns:a14="http://schemas.microsoft.com/office/drawing/2010/main" xmlns="">
+                <a14:hiddenFill xmlns="" xmlns:a14="http://schemas.microsoft.com/office/drawing/2010/main">
                   <a:noFill/>
                 </a14:hiddenFill>
               </a:ext>
               <a:ext uri="{AF507438-7753-43E0-B8FC-AC1667EBCBE1}">
-                <a14:hiddenEffects xmlns:a14="http://schemas.microsoft.com/office/drawing/2010/main" xmlns="">
+                <a14:hiddenEffects xmlns="" xmlns:a14="http://schemas.microsoft.com/office/drawing/2010/main">
                   <a:effectLst>
                     <a:outerShdw dist="35921" dir="2700000" algn="ctr" rotWithShape="0">
                       <a:schemeClr val="bg2"/>
@@ -5374,12 +5374,12 @@
             <a:effectLst/>
             <a:extLst>
               <a:ext uri="{909E8E84-426E-40DD-AFC4-6F175D3DCCD1}">
-                <a14:hiddenFill xmlns:a14="http://schemas.microsoft.com/office/drawing/2010/main" xmlns="">
+                <a14:hiddenFill xmlns="" xmlns:a14="http://schemas.microsoft.com/office/drawing/2010/main">
                   <a:noFill/>
                 </a14:hiddenFill>
               </a:ext>
               <a:ext uri="{AF507438-7753-43E0-B8FC-AC1667EBCBE1}">
-                <a14:hiddenEffects xmlns:a14="http://schemas.microsoft.com/office/drawing/2010/main" xmlns="">
+                <a14:hiddenEffects xmlns="" xmlns:a14="http://schemas.microsoft.com/office/drawing/2010/main">
                   <a:effectLst>
                     <a:outerShdw dist="35921" dir="2700000" algn="ctr" rotWithShape="0">
                       <a:schemeClr val="bg2"/>
@@ -5426,12 +5426,12 @@
             <a:effectLst/>
             <a:extLst>
               <a:ext uri="{909E8E84-426E-40DD-AFC4-6F175D3DCCD1}">
-                <a14:hiddenFill xmlns:a14="http://schemas.microsoft.com/office/drawing/2010/main" xmlns="">
+                <a14:hiddenFill xmlns="" xmlns:a14="http://schemas.microsoft.com/office/drawing/2010/main">
                   <a:noFill/>
                 </a14:hiddenFill>
               </a:ext>
               <a:ext uri="{AF507438-7753-43E0-B8FC-AC1667EBCBE1}">
-                <a14:hiddenEffects xmlns:a14="http://schemas.microsoft.com/office/drawing/2010/main" xmlns="">
+                <a14:hiddenEffects xmlns="" xmlns:a14="http://schemas.microsoft.com/office/drawing/2010/main">
                   <a:effectLst>
                     <a:outerShdw dist="35921" dir="2700000" algn="ctr" rotWithShape="0">
                       <a:schemeClr val="bg2"/>
@@ -5478,12 +5478,12 @@
             <a:effectLst/>
             <a:extLst>
               <a:ext uri="{909E8E84-426E-40DD-AFC4-6F175D3DCCD1}">
-                <a14:hiddenFill xmlns:a14="http://schemas.microsoft.com/office/drawing/2010/main" xmlns="">
+                <a14:hiddenFill xmlns="" xmlns:a14="http://schemas.microsoft.com/office/drawing/2010/main">
                   <a:noFill/>
                 </a14:hiddenFill>
               </a:ext>
               <a:ext uri="{AF507438-7753-43E0-B8FC-AC1667EBCBE1}">
-                <a14:hiddenEffects xmlns:a14="http://schemas.microsoft.com/office/drawing/2010/main" xmlns="">
+                <a14:hiddenEffects xmlns="" xmlns:a14="http://schemas.microsoft.com/office/drawing/2010/main">
                   <a:effectLst>
                     <a:outerShdw dist="35921" dir="2700000" algn="ctr" rotWithShape="0">
                       <a:schemeClr val="bg2"/>
@@ -5530,12 +5530,12 @@
             <a:effectLst/>
             <a:extLst>
               <a:ext uri="{909E8E84-426E-40DD-AFC4-6F175D3DCCD1}">
-                <a14:hiddenFill xmlns:a14="http://schemas.microsoft.com/office/drawing/2010/main" xmlns="">
+                <a14:hiddenFill xmlns="" xmlns:a14="http://schemas.microsoft.com/office/drawing/2010/main">
                   <a:noFill/>
                 </a14:hiddenFill>
               </a:ext>
               <a:ext uri="{AF507438-7753-43E0-B8FC-AC1667EBCBE1}">
-                <a14:hiddenEffects xmlns:a14="http://schemas.microsoft.com/office/drawing/2010/main" xmlns="">
+                <a14:hiddenEffects xmlns="" xmlns:a14="http://schemas.microsoft.com/office/drawing/2010/main">
                   <a:effectLst>
                     <a:outerShdw dist="35921" dir="2700000" algn="ctr" rotWithShape="0">
                       <a:schemeClr val="bg2"/>
@@ -5582,12 +5582,12 @@
             <a:effectLst/>
             <a:extLst>
               <a:ext uri="{909E8E84-426E-40DD-AFC4-6F175D3DCCD1}">
-                <a14:hiddenFill xmlns:a14="http://schemas.microsoft.com/office/drawing/2010/main" xmlns="">
+                <a14:hiddenFill xmlns="" xmlns:a14="http://schemas.microsoft.com/office/drawing/2010/main">
                   <a:noFill/>
                 </a14:hiddenFill>
               </a:ext>
               <a:ext uri="{AF507438-7753-43E0-B8FC-AC1667EBCBE1}">
-                <a14:hiddenEffects xmlns:a14="http://schemas.microsoft.com/office/drawing/2010/main" xmlns="">
+                <a14:hiddenEffects xmlns="" xmlns:a14="http://schemas.microsoft.com/office/drawing/2010/main">
                   <a:effectLst>
                     <a:outerShdw dist="35921" dir="2700000" algn="ctr" rotWithShape="0">
                       <a:schemeClr val="bg2"/>
@@ -5634,12 +5634,12 @@
             <a:effectLst/>
             <a:extLst>
               <a:ext uri="{909E8E84-426E-40DD-AFC4-6F175D3DCCD1}">
-                <a14:hiddenFill xmlns:a14="http://schemas.microsoft.com/office/drawing/2010/main" xmlns="">
+                <a14:hiddenFill xmlns="" xmlns:a14="http://schemas.microsoft.com/office/drawing/2010/main">
                   <a:noFill/>
                 </a14:hiddenFill>
               </a:ext>
               <a:ext uri="{AF507438-7753-43E0-B8FC-AC1667EBCBE1}">
-                <a14:hiddenEffects xmlns:a14="http://schemas.microsoft.com/office/drawing/2010/main" xmlns="">
+                <a14:hiddenEffects xmlns="" xmlns:a14="http://schemas.microsoft.com/office/drawing/2010/main">
                   <a:effectLst>
                     <a:outerShdw dist="35921" dir="2700000" algn="ctr" rotWithShape="0">
                       <a:schemeClr val="bg2"/>
@@ -5686,12 +5686,12 @@
             <a:effectLst/>
             <a:extLst>
               <a:ext uri="{909E8E84-426E-40DD-AFC4-6F175D3DCCD1}">
-                <a14:hiddenFill xmlns:a14="http://schemas.microsoft.com/office/drawing/2010/main" xmlns="">
+                <a14:hiddenFill xmlns="" xmlns:a14="http://schemas.microsoft.com/office/drawing/2010/main">
                   <a:noFill/>
                 </a14:hiddenFill>
               </a:ext>
               <a:ext uri="{AF507438-7753-43E0-B8FC-AC1667EBCBE1}">
-                <a14:hiddenEffects xmlns:a14="http://schemas.microsoft.com/office/drawing/2010/main" xmlns="">
+                <a14:hiddenEffects xmlns="" xmlns:a14="http://schemas.microsoft.com/office/drawing/2010/main">
                   <a:effectLst>
                     <a:outerShdw dist="35921" dir="2700000" algn="ctr" rotWithShape="0">
                       <a:schemeClr val="bg2"/>
@@ -5754,12 +5754,12 @@
               <a:effectLst/>
               <a:extLst>
                 <a:ext uri="{909E8E84-426E-40DD-AFC4-6F175D3DCCD1}">
-                  <a14:hiddenFill xmlns:a14="http://schemas.microsoft.com/office/drawing/2010/main" xmlns="">
+                  <a14:hiddenFill xmlns="" xmlns:a14="http://schemas.microsoft.com/office/drawing/2010/main">
                     <a:noFill/>
                   </a14:hiddenFill>
                 </a:ext>
                 <a:ext uri="{AF507438-7753-43E0-B8FC-AC1667EBCBE1}">
-                  <a14:hiddenEffects xmlns:a14="http://schemas.microsoft.com/office/drawing/2010/main" xmlns="">
+                  <a14:hiddenEffects xmlns="" xmlns:a14="http://schemas.microsoft.com/office/drawing/2010/main">
                     <a:effectLst>
                       <a:outerShdw dist="35921" dir="2700000" algn="ctr" rotWithShape="0">
                         <a:schemeClr val="bg2"/>
@@ -5806,12 +5806,12 @@
               <a:effectLst/>
               <a:extLst>
                 <a:ext uri="{909E8E84-426E-40DD-AFC4-6F175D3DCCD1}">
-                  <a14:hiddenFill xmlns:a14="http://schemas.microsoft.com/office/drawing/2010/main" xmlns="">
+                  <a14:hiddenFill xmlns="" xmlns:a14="http://schemas.microsoft.com/office/drawing/2010/main">
                     <a:noFill/>
                   </a14:hiddenFill>
                 </a:ext>
                 <a:ext uri="{AF507438-7753-43E0-B8FC-AC1667EBCBE1}">
-                  <a14:hiddenEffects xmlns:a14="http://schemas.microsoft.com/office/drawing/2010/main" xmlns="">
+                  <a14:hiddenEffects xmlns="" xmlns:a14="http://schemas.microsoft.com/office/drawing/2010/main">
                     <a:effectLst>
                       <a:outerShdw dist="35921" dir="2700000" algn="ctr" rotWithShape="0">
                         <a:schemeClr val="bg2"/>
@@ -5859,12 +5859,12 @@
             <a:effectLst/>
             <a:extLst>
               <a:ext uri="{909E8E84-426E-40DD-AFC4-6F175D3DCCD1}">
-                <a14:hiddenFill xmlns:a14="http://schemas.microsoft.com/office/drawing/2010/main" xmlns="">
+                <a14:hiddenFill xmlns="" xmlns:a14="http://schemas.microsoft.com/office/drawing/2010/main">
                   <a:noFill/>
                 </a14:hiddenFill>
               </a:ext>
               <a:ext uri="{AF507438-7753-43E0-B8FC-AC1667EBCBE1}">
-                <a14:hiddenEffects xmlns:a14="http://schemas.microsoft.com/office/drawing/2010/main" xmlns="">
+                <a14:hiddenEffects xmlns="" xmlns:a14="http://schemas.microsoft.com/office/drawing/2010/main">
                   <a:effectLst>
                     <a:outerShdw dist="35921" dir="2700000" algn="ctr" rotWithShape="0">
                       <a:schemeClr val="bg2"/>
@@ -5927,12 +5927,12 @@
               <a:effectLst/>
               <a:extLst>
                 <a:ext uri="{909E8E84-426E-40DD-AFC4-6F175D3DCCD1}">
-                  <a14:hiddenFill xmlns:a14="http://schemas.microsoft.com/office/drawing/2010/main" xmlns="">
+                  <a14:hiddenFill xmlns="" xmlns:a14="http://schemas.microsoft.com/office/drawing/2010/main">
                     <a:noFill/>
                   </a14:hiddenFill>
                 </a:ext>
                 <a:ext uri="{AF507438-7753-43E0-B8FC-AC1667EBCBE1}">
-                  <a14:hiddenEffects xmlns:a14="http://schemas.microsoft.com/office/drawing/2010/main" xmlns="">
+                  <a14:hiddenEffects xmlns="" xmlns:a14="http://schemas.microsoft.com/office/drawing/2010/main">
                     <a:effectLst>
                       <a:outerShdw dist="35921" dir="2700000" algn="ctr" rotWithShape="0">
                         <a:schemeClr val="bg2"/>
@@ -5979,12 +5979,12 @@
               <a:effectLst/>
               <a:extLst>
                 <a:ext uri="{909E8E84-426E-40DD-AFC4-6F175D3DCCD1}">
-                  <a14:hiddenFill xmlns:a14="http://schemas.microsoft.com/office/drawing/2010/main" xmlns="">
+                  <a14:hiddenFill xmlns="" xmlns:a14="http://schemas.microsoft.com/office/drawing/2010/main">
                     <a:noFill/>
                   </a14:hiddenFill>
                 </a:ext>
                 <a:ext uri="{AF507438-7753-43E0-B8FC-AC1667EBCBE1}">
-                  <a14:hiddenEffects xmlns:a14="http://schemas.microsoft.com/office/drawing/2010/main" xmlns="">
+                  <a14:hiddenEffects xmlns="" xmlns:a14="http://schemas.microsoft.com/office/drawing/2010/main">
                     <a:effectLst>
                       <a:outerShdw dist="35921" dir="2700000" algn="ctr" rotWithShape="0">
                         <a:schemeClr val="bg2"/>
@@ -6032,12 +6032,12 @@
             <a:effectLst/>
             <a:extLst>
               <a:ext uri="{909E8E84-426E-40DD-AFC4-6F175D3DCCD1}">
-                <a14:hiddenFill xmlns:a14="http://schemas.microsoft.com/office/drawing/2010/main" xmlns="">
+                <a14:hiddenFill xmlns="" xmlns:a14="http://schemas.microsoft.com/office/drawing/2010/main">
                   <a:noFill/>
                 </a14:hiddenFill>
               </a:ext>
               <a:ext uri="{AF507438-7753-43E0-B8FC-AC1667EBCBE1}">
-                <a14:hiddenEffects xmlns:a14="http://schemas.microsoft.com/office/drawing/2010/main" xmlns="">
+                <a14:hiddenEffects xmlns="" xmlns:a14="http://schemas.microsoft.com/office/drawing/2010/main">
                   <a:effectLst>
                     <a:outerShdw dist="35921" dir="2700000" algn="ctr" rotWithShape="0">
                       <a:schemeClr val="bg2"/>
@@ -6084,12 +6084,12 @@
             <a:effectLst/>
             <a:extLst>
               <a:ext uri="{909E8E84-426E-40DD-AFC4-6F175D3DCCD1}">
-                <a14:hiddenFill xmlns:a14="http://schemas.microsoft.com/office/drawing/2010/main" xmlns="">
+                <a14:hiddenFill xmlns="" xmlns:a14="http://schemas.microsoft.com/office/drawing/2010/main">
                   <a:noFill/>
                 </a14:hiddenFill>
               </a:ext>
               <a:ext uri="{AF507438-7753-43E0-B8FC-AC1667EBCBE1}">
-                <a14:hiddenEffects xmlns:a14="http://schemas.microsoft.com/office/drawing/2010/main" xmlns="">
+                <a14:hiddenEffects xmlns="" xmlns:a14="http://schemas.microsoft.com/office/drawing/2010/main">
                   <a:effectLst>
                     <a:outerShdw dist="35921" dir="2700000" algn="ctr" rotWithShape="0">
                       <a:schemeClr val="bg2"/>
@@ -6136,12 +6136,12 @@
             <a:effectLst/>
             <a:extLst>
               <a:ext uri="{909E8E84-426E-40DD-AFC4-6F175D3DCCD1}">
-                <a14:hiddenFill xmlns:a14="http://schemas.microsoft.com/office/drawing/2010/main" xmlns="">
+                <a14:hiddenFill xmlns="" xmlns:a14="http://schemas.microsoft.com/office/drawing/2010/main">
                   <a:noFill/>
                 </a14:hiddenFill>
               </a:ext>
               <a:ext uri="{AF507438-7753-43E0-B8FC-AC1667EBCBE1}">
-                <a14:hiddenEffects xmlns:a14="http://schemas.microsoft.com/office/drawing/2010/main" xmlns="">
+                <a14:hiddenEffects xmlns="" xmlns:a14="http://schemas.microsoft.com/office/drawing/2010/main">
                   <a:effectLst>
                     <a:outerShdw dist="35921" dir="2700000" algn="ctr" rotWithShape="0">
                       <a:schemeClr val="bg2"/>
@@ -6188,12 +6188,12 @@
             <a:effectLst/>
             <a:extLst>
               <a:ext uri="{909E8E84-426E-40DD-AFC4-6F175D3DCCD1}">
-                <a14:hiddenFill xmlns:a14="http://schemas.microsoft.com/office/drawing/2010/main" xmlns="">
+                <a14:hiddenFill xmlns="" xmlns:a14="http://schemas.microsoft.com/office/drawing/2010/main">
                   <a:noFill/>
                 </a14:hiddenFill>
               </a:ext>
               <a:ext uri="{AF507438-7753-43E0-B8FC-AC1667EBCBE1}">
-                <a14:hiddenEffects xmlns:a14="http://schemas.microsoft.com/office/drawing/2010/main" xmlns="">
+                <a14:hiddenEffects xmlns="" xmlns:a14="http://schemas.microsoft.com/office/drawing/2010/main">
                   <a:effectLst>
                     <a:outerShdw dist="35921" dir="2700000" algn="ctr" rotWithShape="0">
                       <a:schemeClr val="bg2"/>
@@ -6256,12 +6256,12 @@
               <a:effectLst/>
               <a:extLst>
                 <a:ext uri="{909E8E84-426E-40DD-AFC4-6F175D3DCCD1}">
-                  <a14:hiddenFill xmlns:a14="http://schemas.microsoft.com/office/drawing/2010/main" xmlns="">
+                  <a14:hiddenFill xmlns="" xmlns:a14="http://schemas.microsoft.com/office/drawing/2010/main">
                     <a:noFill/>
                   </a14:hiddenFill>
                 </a:ext>
                 <a:ext uri="{AF507438-7753-43E0-B8FC-AC1667EBCBE1}">
-                  <a14:hiddenEffects xmlns:a14="http://schemas.microsoft.com/office/drawing/2010/main" xmlns="">
+                  <a14:hiddenEffects xmlns="" xmlns:a14="http://schemas.microsoft.com/office/drawing/2010/main">
                     <a:effectLst>
                       <a:outerShdw dist="35921" dir="2700000" algn="ctr" rotWithShape="0">
                         <a:schemeClr val="bg2"/>
@@ -6308,12 +6308,12 @@
               <a:effectLst/>
               <a:extLst>
                 <a:ext uri="{909E8E84-426E-40DD-AFC4-6F175D3DCCD1}">
-                  <a14:hiddenFill xmlns:a14="http://schemas.microsoft.com/office/drawing/2010/main" xmlns="">
+                  <a14:hiddenFill xmlns="" xmlns:a14="http://schemas.microsoft.com/office/drawing/2010/main">
                     <a:noFill/>
                   </a14:hiddenFill>
                 </a:ext>
                 <a:ext uri="{AF507438-7753-43E0-B8FC-AC1667EBCBE1}">
-                  <a14:hiddenEffects xmlns:a14="http://schemas.microsoft.com/office/drawing/2010/main" xmlns="">
+                  <a14:hiddenEffects xmlns="" xmlns:a14="http://schemas.microsoft.com/office/drawing/2010/main">
                     <a:effectLst>
                       <a:outerShdw dist="35921" dir="2700000" algn="ctr" rotWithShape="0">
                         <a:schemeClr val="bg2"/>
@@ -6345,7 +6345,7 @@
           <a:blip r:embed="rId2" cstate="print">
             <a:extLst>
               <a:ext uri="{28A0092B-C50C-407E-A947-70E740481C1C}">
-                <a14:useLocalDpi xmlns:a14="http://schemas.microsoft.com/office/drawing/2010/main" xmlns="" val="0"/>
+                <a14:useLocalDpi xmlns="" xmlns:a14="http://schemas.microsoft.com/office/drawing/2010/main" val="0"/>
               </a:ext>
             </a:extLst>
           </a:blip>
@@ -6368,14 +6368,14 @@
           </a:ln>
           <a:extLst>
             <a:ext uri="{909E8E84-426E-40DD-AFC4-6F175D3DCCD1}">
-              <a14:hiddenFill xmlns:a14="http://schemas.microsoft.com/office/drawing/2010/main" xmlns="">
+              <a14:hiddenFill xmlns="" xmlns:a14="http://schemas.microsoft.com/office/drawing/2010/main">
                 <a:solidFill>
                   <a:srgbClr val="FFFFFF"/>
                 </a:solidFill>
               </a14:hiddenFill>
             </a:ext>
             <a:ext uri="{91240B29-F687-4F45-9708-019B960494DF}">
-              <a14:hiddenLine xmlns:a14="http://schemas.microsoft.com/office/drawing/2010/main" xmlns="" w="9525">
+              <a14:hiddenLine xmlns="" xmlns:a14="http://schemas.microsoft.com/office/drawing/2010/main" w="9525">
                 <a:solidFill>
                   <a:srgbClr val="000000"/>
                 </a:solidFill>
@@ -6523,7 +6523,7 @@
     </p:spTree>
     <p:extLst>
       <p:ext uri="{BB962C8B-B14F-4D97-AF65-F5344CB8AC3E}">
-        <p14:creationId xmlns:p14="http://schemas.microsoft.com/office/powerpoint/2010/main" xmlns="" val="1160233614"/>
+        <p14:creationId xmlns="" xmlns:p14="http://schemas.microsoft.com/office/powerpoint/2010/main" val="1160233614"/>
       </p:ext>
     </p:extLst>
   </p:cSld>
@@ -6689,7 +6689,7 @@
     </p:spTree>
     <p:extLst>
       <p:ext uri="{BB962C8B-B14F-4D97-AF65-F5344CB8AC3E}">
-        <p14:creationId xmlns:p14="http://schemas.microsoft.com/office/powerpoint/2010/main" xmlns="" val="421425143"/>
+        <p14:creationId xmlns="" xmlns:p14="http://schemas.microsoft.com/office/powerpoint/2010/main" val="421425143"/>
       </p:ext>
     </p:extLst>
   </p:cSld>
@@ -6865,7 +6865,7 @@
     </p:spTree>
     <p:extLst>
       <p:ext uri="{BB962C8B-B14F-4D97-AF65-F5344CB8AC3E}">
-        <p14:creationId xmlns:p14="http://schemas.microsoft.com/office/powerpoint/2010/main" xmlns="" val="349952495"/>
+        <p14:creationId xmlns="" xmlns:p14="http://schemas.microsoft.com/office/powerpoint/2010/main" val="349952495"/>
       </p:ext>
     </p:extLst>
   </p:cSld>
@@ -7040,7 +7040,7 @@
           <a:blip r:embed="rId2" cstate="print">
             <a:extLst>
               <a:ext uri="{28A0092B-C50C-407E-A947-70E740481C1C}">
-                <a14:useLocalDpi xmlns="" xmlns:a14="http://schemas.microsoft.com/office/drawing/2010/main" val="0"/>
+                <a14:useLocalDpi xmlns:a14="http://schemas.microsoft.com/office/drawing/2010/main" xmlns="" val="0"/>
               </a:ext>
             </a:extLst>
           </a:blip>
@@ -7061,7 +7061,7 @@
     </p:spTree>
     <p:extLst>
       <p:ext uri="{BB962C8B-B14F-4D97-AF65-F5344CB8AC3E}">
-        <p14:creationId xmlns:p14="http://schemas.microsoft.com/office/powerpoint/2010/main" xmlns="" val="188396699"/>
+        <p14:creationId xmlns="" xmlns:p14="http://schemas.microsoft.com/office/powerpoint/2010/main" val="188396699"/>
       </p:ext>
     </p:extLst>
   </p:cSld>
@@ -7249,7 +7249,7 @@
     </p:spTree>
     <p:extLst>
       <p:ext uri="{BB962C8B-B14F-4D97-AF65-F5344CB8AC3E}">
-        <p14:creationId xmlns:p14="http://schemas.microsoft.com/office/powerpoint/2010/main" xmlns="" val="1810695752"/>
+        <p14:creationId xmlns="" xmlns:p14="http://schemas.microsoft.com/office/powerpoint/2010/main" val="1810695752"/>
       </p:ext>
     </p:extLst>
   </p:cSld>
@@ -7533,7 +7533,7 @@
     </p:spTree>
     <p:extLst>
       <p:ext uri="{BB962C8B-B14F-4D97-AF65-F5344CB8AC3E}">
-        <p14:creationId xmlns:p14="http://schemas.microsoft.com/office/powerpoint/2010/main" xmlns="" val="1925595977"/>
+        <p14:creationId xmlns="" xmlns:p14="http://schemas.microsoft.com/office/powerpoint/2010/main" val="1925595977"/>
       </p:ext>
     </p:extLst>
   </p:cSld>
@@ -7956,7 +7956,7 @@
     </p:spTree>
     <p:extLst>
       <p:ext uri="{BB962C8B-B14F-4D97-AF65-F5344CB8AC3E}">
-        <p14:creationId xmlns:p14="http://schemas.microsoft.com/office/powerpoint/2010/main" xmlns="" val="2167587995"/>
+        <p14:creationId xmlns="" xmlns:p14="http://schemas.microsoft.com/office/powerpoint/2010/main" val="2167587995"/>
       </p:ext>
     </p:extLst>
   </p:cSld>
@@ -8070,7 +8070,7 @@
     </p:spTree>
     <p:extLst>
       <p:ext uri="{BB962C8B-B14F-4D97-AF65-F5344CB8AC3E}">
-        <p14:creationId xmlns:p14="http://schemas.microsoft.com/office/powerpoint/2010/main" xmlns="" val="3369313289"/>
+        <p14:creationId xmlns="" xmlns:p14="http://schemas.microsoft.com/office/powerpoint/2010/main" val="3369313289"/>
       </p:ext>
     </p:extLst>
   </p:cSld>
@@ -8161,7 +8161,7 @@
     </p:spTree>
     <p:extLst>
       <p:ext uri="{BB962C8B-B14F-4D97-AF65-F5344CB8AC3E}">
-        <p14:creationId xmlns:p14="http://schemas.microsoft.com/office/powerpoint/2010/main" xmlns="" val="4163330832"/>
+        <p14:creationId xmlns="" xmlns:p14="http://schemas.microsoft.com/office/powerpoint/2010/main" val="4163330832"/>
       </p:ext>
     </p:extLst>
   </p:cSld>
@@ -8434,7 +8434,7 @@
     </p:spTree>
     <p:extLst>
       <p:ext uri="{BB962C8B-B14F-4D97-AF65-F5344CB8AC3E}">
-        <p14:creationId xmlns:p14="http://schemas.microsoft.com/office/powerpoint/2010/main" xmlns="" val="165993774"/>
+        <p14:creationId xmlns="" xmlns:p14="http://schemas.microsoft.com/office/powerpoint/2010/main" val="165993774"/>
       </p:ext>
     </p:extLst>
   </p:cSld>
@@ -8684,7 +8684,7 @@
     </p:spTree>
     <p:extLst>
       <p:ext uri="{BB962C8B-B14F-4D97-AF65-F5344CB8AC3E}">
-        <p14:creationId xmlns:p14="http://schemas.microsoft.com/office/powerpoint/2010/main" xmlns="" val="389564819"/>
+        <p14:creationId xmlns="" xmlns:p14="http://schemas.microsoft.com/office/powerpoint/2010/main" val="389564819"/>
       </p:ext>
     </p:extLst>
   </p:cSld>
@@ -8741,14 +8741,14 @@
           <a:effectLst/>
           <a:extLst>
             <a:ext uri="{909E8E84-426E-40DD-AFC4-6F175D3DCCD1}">
-              <a14:hiddenFill xmlns:a14="http://schemas.microsoft.com/office/drawing/2010/main" xmlns="">
+              <a14:hiddenFill xmlns="" xmlns:a14="http://schemas.microsoft.com/office/drawing/2010/main">
                 <a:solidFill>
                   <a:schemeClr val="accent1"/>
                 </a:solidFill>
               </a14:hiddenFill>
             </a:ext>
             <a:ext uri="{91240B29-F687-4F45-9708-019B960494DF}">
-              <a14:hiddenLine xmlns:a14="http://schemas.microsoft.com/office/drawing/2010/main" xmlns="" w="9525">
+              <a14:hiddenLine xmlns="" xmlns:a14="http://schemas.microsoft.com/office/drawing/2010/main" w="9525">
                 <a:solidFill>
                   <a:schemeClr val="tx1"/>
                 </a:solidFill>
@@ -8758,7 +8758,7 @@
               </a14:hiddenLine>
             </a:ext>
             <a:ext uri="{AF507438-7753-43E0-B8FC-AC1667EBCBE1}">
-              <a14:hiddenEffects xmlns:a14="http://schemas.microsoft.com/office/drawing/2010/main" xmlns="">
+              <a14:hiddenEffects xmlns="" xmlns:a14="http://schemas.microsoft.com/office/drawing/2010/main">
                 <a:effectLst>
                   <a:outerShdw dist="35921" dir="2700000" algn="ctr" rotWithShape="0">
                     <a:schemeClr val="bg2"/>
@@ -8809,14 +8809,14 @@
           <a:effectLst/>
           <a:extLst>
             <a:ext uri="{909E8E84-426E-40DD-AFC4-6F175D3DCCD1}">
-              <a14:hiddenFill xmlns:a14="http://schemas.microsoft.com/office/drawing/2010/main" xmlns="">
+              <a14:hiddenFill xmlns="" xmlns:a14="http://schemas.microsoft.com/office/drawing/2010/main">
                 <a:solidFill>
                   <a:schemeClr val="accent1"/>
                 </a:solidFill>
               </a14:hiddenFill>
             </a:ext>
             <a:ext uri="{91240B29-F687-4F45-9708-019B960494DF}">
-              <a14:hiddenLine xmlns:a14="http://schemas.microsoft.com/office/drawing/2010/main" xmlns="" w="9525">
+              <a14:hiddenLine xmlns="" xmlns:a14="http://schemas.microsoft.com/office/drawing/2010/main" w="9525">
                 <a:solidFill>
                   <a:schemeClr val="tx1"/>
                 </a:solidFill>
@@ -8826,7 +8826,7 @@
               </a14:hiddenLine>
             </a:ext>
             <a:ext uri="{AF507438-7753-43E0-B8FC-AC1667EBCBE1}">
-              <a14:hiddenEffects xmlns:a14="http://schemas.microsoft.com/office/drawing/2010/main" xmlns="">
+              <a14:hiddenEffects xmlns="" xmlns:a14="http://schemas.microsoft.com/office/drawing/2010/main">
                 <a:effectLst>
                   <a:outerShdw dist="35921" dir="2700000" algn="ctr" rotWithShape="0">
                     <a:schemeClr val="bg2"/>
@@ -8925,14 +8925,14 @@
             <a:effectLst/>
             <a:extLst>
               <a:ext uri="{909E8E84-426E-40DD-AFC4-6F175D3DCCD1}">
-                <a14:hiddenFill xmlns:a14="http://schemas.microsoft.com/office/drawing/2010/main" xmlns="">
+                <a14:hiddenFill xmlns="" xmlns:a14="http://schemas.microsoft.com/office/drawing/2010/main">
                   <a:solidFill>
                     <a:srgbClr val="D8E0E5"/>
                   </a:solidFill>
                 </a14:hiddenFill>
               </a:ext>
               <a:ext uri="{AF507438-7753-43E0-B8FC-AC1667EBCBE1}">
-                <a14:hiddenEffects xmlns:a14="http://schemas.microsoft.com/office/drawing/2010/main" xmlns="">
+                <a14:hiddenEffects xmlns="" xmlns:a14="http://schemas.microsoft.com/office/drawing/2010/main">
                   <a:effectLst>
                     <a:outerShdw dist="35921" dir="2700000" algn="ctr" rotWithShape="0">
                       <a:schemeClr val="bg2"/>
@@ -8992,12 +8992,12 @@
             <a:effectLst/>
             <a:extLst>
               <a:ext uri="{909E8E84-426E-40DD-AFC4-6F175D3DCCD1}">
-                <a14:hiddenFill xmlns:a14="http://schemas.microsoft.com/office/drawing/2010/main" xmlns="">
+                <a14:hiddenFill xmlns="" xmlns:a14="http://schemas.microsoft.com/office/drawing/2010/main">
                   <a:noFill/>
                 </a14:hiddenFill>
               </a:ext>
               <a:ext uri="{AF507438-7753-43E0-B8FC-AC1667EBCBE1}">
-                <a14:hiddenEffects xmlns:a14="http://schemas.microsoft.com/office/drawing/2010/main" xmlns="">
+                <a14:hiddenEffects xmlns="" xmlns:a14="http://schemas.microsoft.com/office/drawing/2010/main">
                   <a:effectLst>
                     <a:outerShdw dist="35921" dir="2700000" algn="ctr" rotWithShape="0">
                       <a:schemeClr val="bg2"/>
@@ -9044,12 +9044,12 @@
             <a:effectLst/>
             <a:extLst>
               <a:ext uri="{909E8E84-426E-40DD-AFC4-6F175D3DCCD1}">
-                <a14:hiddenFill xmlns:a14="http://schemas.microsoft.com/office/drawing/2010/main" xmlns="">
+                <a14:hiddenFill xmlns="" xmlns:a14="http://schemas.microsoft.com/office/drawing/2010/main">
                   <a:noFill/>
                 </a14:hiddenFill>
               </a:ext>
               <a:ext uri="{AF507438-7753-43E0-B8FC-AC1667EBCBE1}">
-                <a14:hiddenEffects xmlns:a14="http://schemas.microsoft.com/office/drawing/2010/main" xmlns="">
+                <a14:hiddenEffects xmlns="" xmlns:a14="http://schemas.microsoft.com/office/drawing/2010/main">
                   <a:effectLst>
                     <a:outerShdw dist="35921" dir="2700000" algn="ctr" rotWithShape="0">
                       <a:schemeClr val="bg2"/>
@@ -9096,12 +9096,12 @@
             <a:effectLst/>
             <a:extLst>
               <a:ext uri="{909E8E84-426E-40DD-AFC4-6F175D3DCCD1}">
-                <a14:hiddenFill xmlns:a14="http://schemas.microsoft.com/office/drawing/2010/main" xmlns="">
+                <a14:hiddenFill xmlns="" xmlns:a14="http://schemas.microsoft.com/office/drawing/2010/main">
                   <a:noFill/>
                 </a14:hiddenFill>
               </a:ext>
               <a:ext uri="{AF507438-7753-43E0-B8FC-AC1667EBCBE1}">
-                <a14:hiddenEffects xmlns:a14="http://schemas.microsoft.com/office/drawing/2010/main" xmlns="">
+                <a14:hiddenEffects xmlns="" xmlns:a14="http://schemas.microsoft.com/office/drawing/2010/main">
                   <a:effectLst>
                     <a:outerShdw dist="35921" dir="2700000" algn="ctr" rotWithShape="0">
                       <a:schemeClr val="bg2"/>
@@ -9148,12 +9148,12 @@
             <a:effectLst/>
             <a:extLst>
               <a:ext uri="{909E8E84-426E-40DD-AFC4-6F175D3DCCD1}">
-                <a14:hiddenFill xmlns:a14="http://schemas.microsoft.com/office/drawing/2010/main" xmlns="">
+                <a14:hiddenFill xmlns="" xmlns:a14="http://schemas.microsoft.com/office/drawing/2010/main">
                   <a:noFill/>
                 </a14:hiddenFill>
               </a:ext>
               <a:ext uri="{AF507438-7753-43E0-B8FC-AC1667EBCBE1}">
-                <a14:hiddenEffects xmlns:a14="http://schemas.microsoft.com/office/drawing/2010/main" xmlns="">
+                <a14:hiddenEffects xmlns="" xmlns:a14="http://schemas.microsoft.com/office/drawing/2010/main">
                   <a:effectLst>
                     <a:outerShdw dist="35921" dir="2700000" algn="ctr" rotWithShape="0">
                       <a:schemeClr val="bg2"/>
@@ -9200,12 +9200,12 @@
             <a:effectLst/>
             <a:extLst>
               <a:ext uri="{909E8E84-426E-40DD-AFC4-6F175D3DCCD1}">
-                <a14:hiddenFill xmlns:a14="http://schemas.microsoft.com/office/drawing/2010/main" xmlns="">
+                <a14:hiddenFill xmlns="" xmlns:a14="http://schemas.microsoft.com/office/drawing/2010/main">
                   <a:noFill/>
                 </a14:hiddenFill>
               </a:ext>
               <a:ext uri="{AF507438-7753-43E0-B8FC-AC1667EBCBE1}">
-                <a14:hiddenEffects xmlns:a14="http://schemas.microsoft.com/office/drawing/2010/main" xmlns="">
+                <a14:hiddenEffects xmlns="" xmlns:a14="http://schemas.microsoft.com/office/drawing/2010/main">
                   <a:effectLst>
                     <a:outerShdw dist="35921" dir="2700000" algn="ctr" rotWithShape="0">
                       <a:schemeClr val="bg2"/>
@@ -9252,12 +9252,12 @@
             <a:effectLst/>
             <a:extLst>
               <a:ext uri="{909E8E84-426E-40DD-AFC4-6F175D3DCCD1}">
-                <a14:hiddenFill xmlns:a14="http://schemas.microsoft.com/office/drawing/2010/main" xmlns="">
+                <a14:hiddenFill xmlns="" xmlns:a14="http://schemas.microsoft.com/office/drawing/2010/main">
                   <a:noFill/>
                 </a14:hiddenFill>
               </a:ext>
               <a:ext uri="{AF507438-7753-43E0-B8FC-AC1667EBCBE1}">
-                <a14:hiddenEffects xmlns:a14="http://schemas.microsoft.com/office/drawing/2010/main" xmlns="">
+                <a14:hiddenEffects xmlns="" xmlns:a14="http://schemas.microsoft.com/office/drawing/2010/main">
                   <a:effectLst>
                     <a:outerShdw dist="35921" dir="2700000" algn="ctr" rotWithShape="0">
                       <a:schemeClr val="bg2"/>
@@ -9304,12 +9304,12 @@
             <a:effectLst/>
             <a:extLst>
               <a:ext uri="{909E8E84-426E-40DD-AFC4-6F175D3DCCD1}">
-                <a14:hiddenFill xmlns:a14="http://schemas.microsoft.com/office/drawing/2010/main" xmlns="">
+                <a14:hiddenFill xmlns="" xmlns:a14="http://schemas.microsoft.com/office/drawing/2010/main">
                   <a:noFill/>
                 </a14:hiddenFill>
               </a:ext>
               <a:ext uri="{AF507438-7753-43E0-B8FC-AC1667EBCBE1}">
-                <a14:hiddenEffects xmlns:a14="http://schemas.microsoft.com/office/drawing/2010/main" xmlns="">
+                <a14:hiddenEffects xmlns="" xmlns:a14="http://schemas.microsoft.com/office/drawing/2010/main">
                   <a:effectLst>
                     <a:outerShdw dist="35921" dir="2700000" algn="ctr" rotWithShape="0">
                       <a:schemeClr val="bg2"/>
@@ -9356,12 +9356,12 @@
             <a:effectLst/>
             <a:extLst>
               <a:ext uri="{909E8E84-426E-40DD-AFC4-6F175D3DCCD1}">
-                <a14:hiddenFill xmlns:a14="http://schemas.microsoft.com/office/drawing/2010/main" xmlns="">
+                <a14:hiddenFill xmlns="" xmlns:a14="http://schemas.microsoft.com/office/drawing/2010/main">
                   <a:noFill/>
                 </a14:hiddenFill>
               </a:ext>
               <a:ext uri="{AF507438-7753-43E0-B8FC-AC1667EBCBE1}">
-                <a14:hiddenEffects xmlns:a14="http://schemas.microsoft.com/office/drawing/2010/main" xmlns="">
+                <a14:hiddenEffects xmlns="" xmlns:a14="http://schemas.microsoft.com/office/drawing/2010/main">
                   <a:effectLst>
                     <a:outerShdw dist="35921" dir="2700000" algn="ctr" rotWithShape="0">
                       <a:schemeClr val="bg2"/>
@@ -9408,12 +9408,12 @@
             <a:effectLst/>
             <a:extLst>
               <a:ext uri="{909E8E84-426E-40DD-AFC4-6F175D3DCCD1}">
-                <a14:hiddenFill xmlns:a14="http://schemas.microsoft.com/office/drawing/2010/main" xmlns="">
+                <a14:hiddenFill xmlns="" xmlns:a14="http://schemas.microsoft.com/office/drawing/2010/main">
                   <a:noFill/>
                 </a14:hiddenFill>
               </a:ext>
               <a:ext uri="{AF507438-7753-43E0-B8FC-AC1667EBCBE1}">
-                <a14:hiddenEffects xmlns:a14="http://schemas.microsoft.com/office/drawing/2010/main" xmlns="">
+                <a14:hiddenEffects xmlns="" xmlns:a14="http://schemas.microsoft.com/office/drawing/2010/main">
                   <a:effectLst>
                     <a:outerShdw dist="35921" dir="2700000" algn="ctr" rotWithShape="0">
                       <a:schemeClr val="bg2"/>
@@ -9460,12 +9460,12 @@
             <a:effectLst/>
             <a:extLst>
               <a:ext uri="{909E8E84-426E-40DD-AFC4-6F175D3DCCD1}">
-                <a14:hiddenFill xmlns:a14="http://schemas.microsoft.com/office/drawing/2010/main" xmlns="">
+                <a14:hiddenFill xmlns="" xmlns:a14="http://schemas.microsoft.com/office/drawing/2010/main">
                   <a:noFill/>
                 </a14:hiddenFill>
               </a:ext>
               <a:ext uri="{AF507438-7753-43E0-B8FC-AC1667EBCBE1}">
-                <a14:hiddenEffects xmlns:a14="http://schemas.microsoft.com/office/drawing/2010/main" xmlns="">
+                <a14:hiddenEffects xmlns="" xmlns:a14="http://schemas.microsoft.com/office/drawing/2010/main">
                   <a:effectLst>
                     <a:outerShdw dist="35921" dir="2700000" algn="ctr" rotWithShape="0">
                       <a:schemeClr val="bg2"/>
@@ -9512,12 +9512,12 @@
             <a:effectLst/>
             <a:extLst>
               <a:ext uri="{909E8E84-426E-40DD-AFC4-6F175D3DCCD1}">
-                <a14:hiddenFill xmlns:a14="http://schemas.microsoft.com/office/drawing/2010/main" xmlns="">
+                <a14:hiddenFill xmlns="" xmlns:a14="http://schemas.microsoft.com/office/drawing/2010/main">
                   <a:noFill/>
                 </a14:hiddenFill>
               </a:ext>
               <a:ext uri="{AF507438-7753-43E0-B8FC-AC1667EBCBE1}">
-                <a14:hiddenEffects xmlns:a14="http://schemas.microsoft.com/office/drawing/2010/main" xmlns="">
+                <a14:hiddenEffects xmlns="" xmlns:a14="http://schemas.microsoft.com/office/drawing/2010/main">
                   <a:effectLst>
                     <a:outerShdw dist="35921" dir="2700000" algn="ctr" rotWithShape="0">
                       <a:schemeClr val="bg2"/>
@@ -9564,12 +9564,12 @@
             <a:effectLst/>
             <a:extLst>
               <a:ext uri="{909E8E84-426E-40DD-AFC4-6F175D3DCCD1}">
-                <a14:hiddenFill xmlns:a14="http://schemas.microsoft.com/office/drawing/2010/main" xmlns="">
+                <a14:hiddenFill xmlns="" xmlns:a14="http://schemas.microsoft.com/office/drawing/2010/main">
                   <a:noFill/>
                 </a14:hiddenFill>
               </a:ext>
               <a:ext uri="{AF507438-7753-43E0-B8FC-AC1667EBCBE1}">
-                <a14:hiddenEffects xmlns:a14="http://schemas.microsoft.com/office/drawing/2010/main" xmlns="">
+                <a14:hiddenEffects xmlns="" xmlns:a14="http://schemas.microsoft.com/office/drawing/2010/main">
                   <a:effectLst>
                     <a:outerShdw dist="35921" dir="2700000" algn="ctr" rotWithShape="0">
                       <a:schemeClr val="bg2"/>
@@ -9616,12 +9616,12 @@
             <a:effectLst/>
             <a:extLst>
               <a:ext uri="{909E8E84-426E-40DD-AFC4-6F175D3DCCD1}">
-                <a14:hiddenFill xmlns:a14="http://schemas.microsoft.com/office/drawing/2010/main" xmlns="">
+                <a14:hiddenFill xmlns="" xmlns:a14="http://schemas.microsoft.com/office/drawing/2010/main">
                   <a:noFill/>
                 </a14:hiddenFill>
               </a:ext>
               <a:ext uri="{AF507438-7753-43E0-B8FC-AC1667EBCBE1}">
-                <a14:hiddenEffects xmlns:a14="http://schemas.microsoft.com/office/drawing/2010/main" xmlns="">
+                <a14:hiddenEffects xmlns="" xmlns:a14="http://schemas.microsoft.com/office/drawing/2010/main">
                   <a:effectLst>
                     <a:outerShdw dist="35921" dir="2700000" algn="ctr" rotWithShape="0">
                       <a:schemeClr val="bg2"/>
@@ -9684,12 +9684,12 @@
               <a:effectLst/>
               <a:extLst>
                 <a:ext uri="{909E8E84-426E-40DD-AFC4-6F175D3DCCD1}">
-                  <a14:hiddenFill xmlns:a14="http://schemas.microsoft.com/office/drawing/2010/main" xmlns="">
+                  <a14:hiddenFill xmlns="" xmlns:a14="http://schemas.microsoft.com/office/drawing/2010/main">
                     <a:noFill/>
                   </a14:hiddenFill>
                 </a:ext>
                 <a:ext uri="{AF507438-7753-43E0-B8FC-AC1667EBCBE1}">
-                  <a14:hiddenEffects xmlns:a14="http://schemas.microsoft.com/office/drawing/2010/main" xmlns="">
+                  <a14:hiddenEffects xmlns="" xmlns:a14="http://schemas.microsoft.com/office/drawing/2010/main">
                     <a:effectLst>
                       <a:outerShdw dist="35921" dir="2700000" algn="ctr" rotWithShape="0">
                         <a:schemeClr val="bg2"/>
@@ -9736,12 +9736,12 @@
               <a:effectLst/>
               <a:extLst>
                 <a:ext uri="{909E8E84-426E-40DD-AFC4-6F175D3DCCD1}">
-                  <a14:hiddenFill xmlns:a14="http://schemas.microsoft.com/office/drawing/2010/main" xmlns="">
+                  <a14:hiddenFill xmlns="" xmlns:a14="http://schemas.microsoft.com/office/drawing/2010/main">
                     <a:noFill/>
                   </a14:hiddenFill>
                 </a:ext>
                 <a:ext uri="{AF507438-7753-43E0-B8FC-AC1667EBCBE1}">
-                  <a14:hiddenEffects xmlns:a14="http://schemas.microsoft.com/office/drawing/2010/main" xmlns="">
+                  <a14:hiddenEffects xmlns="" xmlns:a14="http://schemas.microsoft.com/office/drawing/2010/main">
                     <a:effectLst>
                       <a:outerShdw dist="35921" dir="2700000" algn="ctr" rotWithShape="0">
                         <a:schemeClr val="bg2"/>
@@ -9789,12 +9789,12 @@
             <a:effectLst/>
             <a:extLst>
               <a:ext uri="{909E8E84-426E-40DD-AFC4-6F175D3DCCD1}">
-                <a14:hiddenFill xmlns:a14="http://schemas.microsoft.com/office/drawing/2010/main" xmlns="">
+                <a14:hiddenFill xmlns="" xmlns:a14="http://schemas.microsoft.com/office/drawing/2010/main">
                   <a:noFill/>
                 </a14:hiddenFill>
               </a:ext>
               <a:ext uri="{AF507438-7753-43E0-B8FC-AC1667EBCBE1}">
-                <a14:hiddenEffects xmlns:a14="http://schemas.microsoft.com/office/drawing/2010/main" xmlns="">
+                <a14:hiddenEffects xmlns="" xmlns:a14="http://schemas.microsoft.com/office/drawing/2010/main">
                   <a:effectLst>
                     <a:outerShdw dist="35921" dir="2700000" algn="ctr" rotWithShape="0">
                       <a:schemeClr val="bg2"/>
@@ -9857,12 +9857,12 @@
               <a:effectLst/>
               <a:extLst>
                 <a:ext uri="{909E8E84-426E-40DD-AFC4-6F175D3DCCD1}">
-                  <a14:hiddenFill xmlns:a14="http://schemas.microsoft.com/office/drawing/2010/main" xmlns="">
+                  <a14:hiddenFill xmlns="" xmlns:a14="http://schemas.microsoft.com/office/drawing/2010/main">
                     <a:noFill/>
                   </a14:hiddenFill>
                 </a:ext>
                 <a:ext uri="{AF507438-7753-43E0-B8FC-AC1667EBCBE1}">
-                  <a14:hiddenEffects xmlns:a14="http://schemas.microsoft.com/office/drawing/2010/main" xmlns="">
+                  <a14:hiddenEffects xmlns="" xmlns:a14="http://schemas.microsoft.com/office/drawing/2010/main">
                     <a:effectLst>
                       <a:outerShdw dist="35921" dir="2700000" algn="ctr" rotWithShape="0">
                         <a:schemeClr val="bg2"/>
@@ -9909,12 +9909,12 @@
               <a:effectLst/>
               <a:extLst>
                 <a:ext uri="{909E8E84-426E-40DD-AFC4-6F175D3DCCD1}">
-                  <a14:hiddenFill xmlns:a14="http://schemas.microsoft.com/office/drawing/2010/main" xmlns="">
+                  <a14:hiddenFill xmlns="" xmlns:a14="http://schemas.microsoft.com/office/drawing/2010/main">
                     <a:noFill/>
                   </a14:hiddenFill>
                 </a:ext>
                 <a:ext uri="{AF507438-7753-43E0-B8FC-AC1667EBCBE1}">
-                  <a14:hiddenEffects xmlns:a14="http://schemas.microsoft.com/office/drawing/2010/main" xmlns="">
+                  <a14:hiddenEffects xmlns="" xmlns:a14="http://schemas.microsoft.com/office/drawing/2010/main">
                     <a:effectLst>
                       <a:outerShdw dist="35921" dir="2700000" algn="ctr" rotWithShape="0">
                         <a:schemeClr val="bg2"/>
@@ -9962,12 +9962,12 @@
             <a:effectLst/>
             <a:extLst>
               <a:ext uri="{909E8E84-426E-40DD-AFC4-6F175D3DCCD1}">
-                <a14:hiddenFill xmlns:a14="http://schemas.microsoft.com/office/drawing/2010/main" xmlns="">
+                <a14:hiddenFill xmlns="" xmlns:a14="http://schemas.microsoft.com/office/drawing/2010/main">
                   <a:noFill/>
                 </a14:hiddenFill>
               </a:ext>
               <a:ext uri="{AF507438-7753-43E0-B8FC-AC1667EBCBE1}">
-                <a14:hiddenEffects xmlns:a14="http://schemas.microsoft.com/office/drawing/2010/main" xmlns="">
+                <a14:hiddenEffects xmlns="" xmlns:a14="http://schemas.microsoft.com/office/drawing/2010/main">
                   <a:effectLst>
                     <a:outerShdw dist="35921" dir="2700000" algn="ctr" rotWithShape="0">
                       <a:schemeClr val="bg2"/>
@@ -10014,12 +10014,12 @@
             <a:effectLst/>
             <a:extLst>
               <a:ext uri="{909E8E84-426E-40DD-AFC4-6F175D3DCCD1}">
-                <a14:hiddenFill xmlns:a14="http://schemas.microsoft.com/office/drawing/2010/main" xmlns="">
+                <a14:hiddenFill xmlns="" xmlns:a14="http://schemas.microsoft.com/office/drawing/2010/main">
                   <a:noFill/>
                 </a14:hiddenFill>
               </a:ext>
               <a:ext uri="{AF507438-7753-43E0-B8FC-AC1667EBCBE1}">
-                <a14:hiddenEffects xmlns:a14="http://schemas.microsoft.com/office/drawing/2010/main" xmlns="">
+                <a14:hiddenEffects xmlns="" xmlns:a14="http://schemas.microsoft.com/office/drawing/2010/main">
                   <a:effectLst>
                     <a:outerShdw dist="35921" dir="2700000" algn="ctr" rotWithShape="0">
                       <a:schemeClr val="bg2"/>
@@ -10066,12 +10066,12 @@
             <a:effectLst/>
             <a:extLst>
               <a:ext uri="{909E8E84-426E-40DD-AFC4-6F175D3DCCD1}">
-                <a14:hiddenFill xmlns:a14="http://schemas.microsoft.com/office/drawing/2010/main" xmlns="">
+                <a14:hiddenFill xmlns="" xmlns:a14="http://schemas.microsoft.com/office/drawing/2010/main">
                   <a:noFill/>
                 </a14:hiddenFill>
               </a:ext>
               <a:ext uri="{AF507438-7753-43E0-B8FC-AC1667EBCBE1}">
-                <a14:hiddenEffects xmlns:a14="http://schemas.microsoft.com/office/drawing/2010/main" xmlns="">
+                <a14:hiddenEffects xmlns="" xmlns:a14="http://schemas.microsoft.com/office/drawing/2010/main">
                   <a:effectLst>
                     <a:outerShdw dist="35921" dir="2700000" algn="ctr" rotWithShape="0">
                       <a:schemeClr val="bg2"/>
@@ -10118,12 +10118,12 @@
             <a:effectLst/>
             <a:extLst>
               <a:ext uri="{909E8E84-426E-40DD-AFC4-6F175D3DCCD1}">
-                <a14:hiddenFill xmlns:a14="http://schemas.microsoft.com/office/drawing/2010/main" xmlns="">
+                <a14:hiddenFill xmlns="" xmlns:a14="http://schemas.microsoft.com/office/drawing/2010/main">
                   <a:noFill/>
                 </a14:hiddenFill>
               </a:ext>
               <a:ext uri="{AF507438-7753-43E0-B8FC-AC1667EBCBE1}">
-                <a14:hiddenEffects xmlns:a14="http://schemas.microsoft.com/office/drawing/2010/main" xmlns="">
+                <a14:hiddenEffects xmlns="" xmlns:a14="http://schemas.microsoft.com/office/drawing/2010/main">
                   <a:effectLst>
                     <a:outerShdw dist="35921" dir="2700000" algn="ctr" rotWithShape="0">
                       <a:schemeClr val="bg2"/>
@@ -10186,12 +10186,12 @@
               <a:effectLst/>
               <a:extLst>
                 <a:ext uri="{909E8E84-426E-40DD-AFC4-6F175D3DCCD1}">
-                  <a14:hiddenFill xmlns:a14="http://schemas.microsoft.com/office/drawing/2010/main" xmlns="">
+                  <a14:hiddenFill xmlns="" xmlns:a14="http://schemas.microsoft.com/office/drawing/2010/main">
                     <a:noFill/>
                   </a14:hiddenFill>
                 </a:ext>
                 <a:ext uri="{AF507438-7753-43E0-B8FC-AC1667EBCBE1}">
-                  <a14:hiddenEffects xmlns:a14="http://schemas.microsoft.com/office/drawing/2010/main" xmlns="">
+                  <a14:hiddenEffects xmlns="" xmlns:a14="http://schemas.microsoft.com/office/drawing/2010/main">
                     <a:effectLst>
                       <a:outerShdw dist="35921" dir="2700000" algn="ctr" rotWithShape="0">
                         <a:schemeClr val="bg2"/>
@@ -10238,12 +10238,12 @@
               <a:effectLst/>
               <a:extLst>
                 <a:ext uri="{909E8E84-426E-40DD-AFC4-6F175D3DCCD1}">
-                  <a14:hiddenFill xmlns:a14="http://schemas.microsoft.com/office/drawing/2010/main" xmlns="">
+                  <a14:hiddenFill xmlns="" xmlns:a14="http://schemas.microsoft.com/office/drawing/2010/main">
                     <a:noFill/>
                   </a14:hiddenFill>
                 </a:ext>
                 <a:ext uri="{AF507438-7753-43E0-B8FC-AC1667EBCBE1}">
-                  <a14:hiddenEffects xmlns:a14="http://schemas.microsoft.com/office/drawing/2010/main" xmlns="">
+                  <a14:hiddenEffects xmlns="" xmlns:a14="http://schemas.microsoft.com/office/drawing/2010/main">
                     <a:effectLst>
                       <a:outerShdw dist="35921" dir="2700000" algn="ctr" rotWithShape="0">
                         <a:schemeClr val="bg2"/>
@@ -10288,14 +10288,14 @@
           <a:effectLst/>
           <a:extLst>
             <a:ext uri="{909E8E84-426E-40DD-AFC4-6F175D3DCCD1}">
-              <a14:hiddenFill xmlns:a14="http://schemas.microsoft.com/office/drawing/2010/main" xmlns="">
+              <a14:hiddenFill xmlns="" xmlns:a14="http://schemas.microsoft.com/office/drawing/2010/main">
                 <a:solidFill>
                   <a:schemeClr val="accent1"/>
                 </a:solidFill>
               </a14:hiddenFill>
             </a:ext>
             <a:ext uri="{91240B29-F687-4F45-9708-019B960494DF}">
-              <a14:hiddenLine xmlns:a14="http://schemas.microsoft.com/office/drawing/2010/main" xmlns="" w="9525">
+              <a14:hiddenLine xmlns="" xmlns:a14="http://schemas.microsoft.com/office/drawing/2010/main" w="9525">
                 <a:solidFill>
                   <a:schemeClr val="tx1"/>
                 </a:solidFill>
@@ -10305,7 +10305,7 @@
               </a14:hiddenLine>
             </a:ext>
             <a:ext uri="{AF507438-7753-43E0-B8FC-AC1667EBCBE1}">
-              <a14:hiddenEffects xmlns:a14="http://schemas.microsoft.com/office/drawing/2010/main" xmlns="">
+              <a14:hiddenEffects xmlns="" xmlns:a14="http://schemas.microsoft.com/office/drawing/2010/main">
                 <a:effectLst>
                   <a:outerShdw dist="35921" dir="2700000" algn="ctr" rotWithShape="0">
                     <a:schemeClr val="bg2"/>
@@ -10393,7 +10393,7 @@
           <a:blip r:embed="rId13" cstate="print">
             <a:extLst>
               <a:ext uri="{28A0092B-C50C-407E-A947-70E740481C1C}">
-                <a14:useLocalDpi xmlns:a14="http://schemas.microsoft.com/office/drawing/2010/main" xmlns="" val="0"/>
+                <a14:useLocalDpi xmlns="" xmlns:a14="http://schemas.microsoft.com/office/drawing/2010/main" val="0"/>
               </a:ext>
             </a:extLst>
           </a:blip>
@@ -10416,14 +10416,14 @@
           </a:ln>
           <a:extLst>
             <a:ext uri="{909E8E84-426E-40DD-AFC4-6F175D3DCCD1}">
-              <a14:hiddenFill xmlns:a14="http://schemas.microsoft.com/office/drawing/2010/main" xmlns="">
+              <a14:hiddenFill xmlns="" xmlns:a14="http://schemas.microsoft.com/office/drawing/2010/main">
                 <a:solidFill>
                   <a:srgbClr val="FFFFFF"/>
                 </a:solidFill>
               </a14:hiddenFill>
             </a:ext>
             <a:ext uri="{91240B29-F687-4F45-9708-019B960494DF}">
-              <a14:hiddenLine xmlns:a14="http://schemas.microsoft.com/office/drawing/2010/main" xmlns="" w="9525">
+              <a14:hiddenLine xmlns="" xmlns:a14="http://schemas.microsoft.com/office/drawing/2010/main" w="9525">
                 <a:solidFill>
                   <a:srgbClr val="000000"/>
                 </a:solidFill>
@@ -10950,14 +10950,14 @@
           <a:effectLst/>
           <a:extLst>
             <a:ext uri="{909E8E84-426E-40DD-AFC4-6F175D3DCCD1}">
-              <a14:hiddenFill xmlns:a14="http://schemas.microsoft.com/office/drawing/2010/main" xmlns="">
+              <a14:hiddenFill xmlns="" xmlns:a14="http://schemas.microsoft.com/office/drawing/2010/main">
                 <a:solidFill>
                   <a:schemeClr val="accent1"/>
                 </a:solidFill>
               </a14:hiddenFill>
             </a:ext>
             <a:ext uri="{91240B29-F687-4F45-9708-019B960494DF}">
-              <a14:hiddenLine xmlns:a14="http://schemas.microsoft.com/office/drawing/2010/main" xmlns="" w="9525">
+              <a14:hiddenLine xmlns="" xmlns:a14="http://schemas.microsoft.com/office/drawing/2010/main" w="9525">
                 <a:solidFill>
                   <a:schemeClr val="tx1"/>
                 </a:solidFill>
@@ -10967,7 +10967,7 @@
               </a14:hiddenLine>
             </a:ext>
             <a:ext uri="{AF507438-7753-43E0-B8FC-AC1667EBCBE1}">
-              <a14:hiddenEffects xmlns:a14="http://schemas.microsoft.com/office/drawing/2010/main" xmlns="">
+              <a14:hiddenEffects xmlns="" xmlns:a14="http://schemas.microsoft.com/office/drawing/2010/main">
                 <a:effectLst>
                   <a:outerShdw dist="35921" dir="2700000" algn="ctr" rotWithShape="0">
                     <a:schemeClr val="bg2"/>
@@ -11066,14 +11066,14 @@
             <a:effectLst/>
             <a:extLst>
               <a:ext uri="{909E8E84-426E-40DD-AFC4-6F175D3DCCD1}">
-                <a14:hiddenFill xmlns:a14="http://schemas.microsoft.com/office/drawing/2010/main" xmlns="">
+                <a14:hiddenFill xmlns="" xmlns:a14="http://schemas.microsoft.com/office/drawing/2010/main">
                   <a:solidFill>
                     <a:srgbClr val="D8E0E5"/>
                   </a:solidFill>
                 </a14:hiddenFill>
               </a:ext>
               <a:ext uri="{AF507438-7753-43E0-B8FC-AC1667EBCBE1}">
-                <a14:hiddenEffects xmlns:a14="http://schemas.microsoft.com/office/drawing/2010/main" xmlns="">
+                <a14:hiddenEffects xmlns="" xmlns:a14="http://schemas.microsoft.com/office/drawing/2010/main">
                   <a:effectLst>
                     <a:outerShdw dist="35921" dir="2700000" algn="ctr" rotWithShape="0">
                       <a:schemeClr val="bg2"/>
@@ -11133,12 +11133,12 @@
             <a:effectLst/>
             <a:extLst>
               <a:ext uri="{909E8E84-426E-40DD-AFC4-6F175D3DCCD1}">
-                <a14:hiddenFill xmlns:a14="http://schemas.microsoft.com/office/drawing/2010/main" xmlns="">
+                <a14:hiddenFill xmlns="" xmlns:a14="http://schemas.microsoft.com/office/drawing/2010/main">
                   <a:noFill/>
                 </a14:hiddenFill>
               </a:ext>
               <a:ext uri="{AF507438-7753-43E0-B8FC-AC1667EBCBE1}">
-                <a14:hiddenEffects xmlns:a14="http://schemas.microsoft.com/office/drawing/2010/main" xmlns="">
+                <a14:hiddenEffects xmlns="" xmlns:a14="http://schemas.microsoft.com/office/drawing/2010/main">
                   <a:effectLst>
                     <a:outerShdw dist="35921" dir="2700000" algn="ctr" rotWithShape="0">
                       <a:schemeClr val="bg2"/>
@@ -11185,12 +11185,12 @@
             <a:effectLst/>
             <a:extLst>
               <a:ext uri="{909E8E84-426E-40DD-AFC4-6F175D3DCCD1}">
-                <a14:hiddenFill xmlns:a14="http://schemas.microsoft.com/office/drawing/2010/main" xmlns="">
+                <a14:hiddenFill xmlns="" xmlns:a14="http://schemas.microsoft.com/office/drawing/2010/main">
                   <a:noFill/>
                 </a14:hiddenFill>
               </a:ext>
               <a:ext uri="{AF507438-7753-43E0-B8FC-AC1667EBCBE1}">
-                <a14:hiddenEffects xmlns:a14="http://schemas.microsoft.com/office/drawing/2010/main" xmlns="">
+                <a14:hiddenEffects xmlns="" xmlns:a14="http://schemas.microsoft.com/office/drawing/2010/main">
                   <a:effectLst>
                     <a:outerShdw dist="35921" dir="2700000" algn="ctr" rotWithShape="0">
                       <a:schemeClr val="bg2"/>
@@ -11237,12 +11237,12 @@
             <a:effectLst/>
             <a:extLst>
               <a:ext uri="{909E8E84-426E-40DD-AFC4-6F175D3DCCD1}">
-                <a14:hiddenFill xmlns:a14="http://schemas.microsoft.com/office/drawing/2010/main" xmlns="">
+                <a14:hiddenFill xmlns="" xmlns:a14="http://schemas.microsoft.com/office/drawing/2010/main">
                   <a:noFill/>
                 </a14:hiddenFill>
               </a:ext>
               <a:ext uri="{AF507438-7753-43E0-B8FC-AC1667EBCBE1}">
-                <a14:hiddenEffects xmlns:a14="http://schemas.microsoft.com/office/drawing/2010/main" xmlns="">
+                <a14:hiddenEffects xmlns="" xmlns:a14="http://schemas.microsoft.com/office/drawing/2010/main">
                   <a:effectLst>
                     <a:outerShdw dist="35921" dir="2700000" algn="ctr" rotWithShape="0">
                       <a:schemeClr val="bg2"/>
@@ -11289,12 +11289,12 @@
             <a:effectLst/>
             <a:extLst>
               <a:ext uri="{909E8E84-426E-40DD-AFC4-6F175D3DCCD1}">
-                <a14:hiddenFill xmlns:a14="http://schemas.microsoft.com/office/drawing/2010/main" xmlns="">
+                <a14:hiddenFill xmlns="" xmlns:a14="http://schemas.microsoft.com/office/drawing/2010/main">
                   <a:noFill/>
                 </a14:hiddenFill>
               </a:ext>
               <a:ext uri="{AF507438-7753-43E0-B8FC-AC1667EBCBE1}">
-                <a14:hiddenEffects xmlns:a14="http://schemas.microsoft.com/office/drawing/2010/main" xmlns="">
+                <a14:hiddenEffects xmlns="" xmlns:a14="http://schemas.microsoft.com/office/drawing/2010/main">
                   <a:effectLst>
                     <a:outerShdw dist="35921" dir="2700000" algn="ctr" rotWithShape="0">
                       <a:schemeClr val="bg2"/>
@@ -11341,12 +11341,12 @@
             <a:effectLst/>
             <a:extLst>
               <a:ext uri="{909E8E84-426E-40DD-AFC4-6F175D3DCCD1}">
-                <a14:hiddenFill xmlns:a14="http://schemas.microsoft.com/office/drawing/2010/main" xmlns="">
+                <a14:hiddenFill xmlns="" xmlns:a14="http://schemas.microsoft.com/office/drawing/2010/main">
                   <a:noFill/>
                 </a14:hiddenFill>
               </a:ext>
               <a:ext uri="{AF507438-7753-43E0-B8FC-AC1667EBCBE1}">
-                <a14:hiddenEffects xmlns:a14="http://schemas.microsoft.com/office/drawing/2010/main" xmlns="">
+                <a14:hiddenEffects xmlns="" xmlns:a14="http://schemas.microsoft.com/office/drawing/2010/main">
                   <a:effectLst>
                     <a:outerShdw dist="35921" dir="2700000" algn="ctr" rotWithShape="0">
                       <a:schemeClr val="bg2"/>
@@ -11393,12 +11393,12 @@
             <a:effectLst/>
             <a:extLst>
               <a:ext uri="{909E8E84-426E-40DD-AFC4-6F175D3DCCD1}">
-                <a14:hiddenFill xmlns:a14="http://schemas.microsoft.com/office/drawing/2010/main" xmlns="">
+                <a14:hiddenFill xmlns="" xmlns:a14="http://schemas.microsoft.com/office/drawing/2010/main">
                   <a:noFill/>
                 </a14:hiddenFill>
               </a:ext>
               <a:ext uri="{AF507438-7753-43E0-B8FC-AC1667EBCBE1}">
-                <a14:hiddenEffects xmlns:a14="http://schemas.microsoft.com/office/drawing/2010/main" xmlns="">
+                <a14:hiddenEffects xmlns="" xmlns:a14="http://schemas.microsoft.com/office/drawing/2010/main">
                   <a:effectLst>
                     <a:outerShdw dist="35921" dir="2700000" algn="ctr" rotWithShape="0">
                       <a:schemeClr val="bg2"/>
@@ -11445,12 +11445,12 @@
             <a:effectLst/>
             <a:extLst>
               <a:ext uri="{909E8E84-426E-40DD-AFC4-6F175D3DCCD1}">
-                <a14:hiddenFill xmlns:a14="http://schemas.microsoft.com/office/drawing/2010/main" xmlns="">
+                <a14:hiddenFill xmlns="" xmlns:a14="http://schemas.microsoft.com/office/drawing/2010/main">
                   <a:noFill/>
                 </a14:hiddenFill>
               </a:ext>
               <a:ext uri="{AF507438-7753-43E0-B8FC-AC1667EBCBE1}">
-                <a14:hiddenEffects xmlns:a14="http://schemas.microsoft.com/office/drawing/2010/main" xmlns="">
+                <a14:hiddenEffects xmlns="" xmlns:a14="http://schemas.microsoft.com/office/drawing/2010/main">
                   <a:effectLst>
                     <a:outerShdw dist="35921" dir="2700000" algn="ctr" rotWithShape="0">
                       <a:schemeClr val="bg2"/>
@@ -11497,12 +11497,12 @@
             <a:effectLst/>
             <a:extLst>
               <a:ext uri="{909E8E84-426E-40DD-AFC4-6F175D3DCCD1}">
-                <a14:hiddenFill xmlns:a14="http://schemas.microsoft.com/office/drawing/2010/main" xmlns="">
+                <a14:hiddenFill xmlns="" xmlns:a14="http://schemas.microsoft.com/office/drawing/2010/main">
                   <a:noFill/>
                 </a14:hiddenFill>
               </a:ext>
               <a:ext uri="{AF507438-7753-43E0-B8FC-AC1667EBCBE1}">
-                <a14:hiddenEffects xmlns:a14="http://schemas.microsoft.com/office/drawing/2010/main" xmlns="">
+                <a14:hiddenEffects xmlns="" xmlns:a14="http://schemas.microsoft.com/office/drawing/2010/main">
                   <a:effectLst>
                     <a:outerShdw dist="35921" dir="2700000" algn="ctr" rotWithShape="0">
                       <a:schemeClr val="bg2"/>
@@ -11549,12 +11549,12 @@
             <a:effectLst/>
             <a:extLst>
               <a:ext uri="{909E8E84-426E-40DD-AFC4-6F175D3DCCD1}">
-                <a14:hiddenFill xmlns:a14="http://schemas.microsoft.com/office/drawing/2010/main" xmlns="">
+                <a14:hiddenFill xmlns="" xmlns:a14="http://schemas.microsoft.com/office/drawing/2010/main">
                   <a:noFill/>
                 </a14:hiddenFill>
               </a:ext>
               <a:ext uri="{AF507438-7753-43E0-B8FC-AC1667EBCBE1}">
-                <a14:hiddenEffects xmlns:a14="http://schemas.microsoft.com/office/drawing/2010/main" xmlns="">
+                <a14:hiddenEffects xmlns="" xmlns:a14="http://schemas.microsoft.com/office/drawing/2010/main">
                   <a:effectLst>
                     <a:outerShdw dist="35921" dir="2700000" algn="ctr" rotWithShape="0">
                       <a:schemeClr val="bg2"/>
@@ -11601,12 +11601,12 @@
             <a:effectLst/>
             <a:extLst>
               <a:ext uri="{909E8E84-426E-40DD-AFC4-6F175D3DCCD1}">
-                <a14:hiddenFill xmlns:a14="http://schemas.microsoft.com/office/drawing/2010/main" xmlns="">
+                <a14:hiddenFill xmlns="" xmlns:a14="http://schemas.microsoft.com/office/drawing/2010/main">
                   <a:noFill/>
                 </a14:hiddenFill>
               </a:ext>
               <a:ext uri="{AF507438-7753-43E0-B8FC-AC1667EBCBE1}">
-                <a14:hiddenEffects xmlns:a14="http://schemas.microsoft.com/office/drawing/2010/main" xmlns="">
+                <a14:hiddenEffects xmlns="" xmlns:a14="http://schemas.microsoft.com/office/drawing/2010/main">
                   <a:effectLst>
                     <a:outerShdw dist="35921" dir="2700000" algn="ctr" rotWithShape="0">
                       <a:schemeClr val="bg2"/>
@@ -11653,12 +11653,12 @@
             <a:effectLst/>
             <a:extLst>
               <a:ext uri="{909E8E84-426E-40DD-AFC4-6F175D3DCCD1}">
-                <a14:hiddenFill xmlns:a14="http://schemas.microsoft.com/office/drawing/2010/main" xmlns="">
+                <a14:hiddenFill xmlns="" xmlns:a14="http://schemas.microsoft.com/office/drawing/2010/main">
                   <a:noFill/>
                 </a14:hiddenFill>
               </a:ext>
               <a:ext uri="{AF507438-7753-43E0-B8FC-AC1667EBCBE1}">
-                <a14:hiddenEffects xmlns:a14="http://schemas.microsoft.com/office/drawing/2010/main" xmlns="">
+                <a14:hiddenEffects xmlns="" xmlns:a14="http://schemas.microsoft.com/office/drawing/2010/main">
                   <a:effectLst>
                     <a:outerShdw dist="35921" dir="2700000" algn="ctr" rotWithShape="0">
                       <a:schemeClr val="bg2"/>
@@ -11705,12 +11705,12 @@
             <a:effectLst/>
             <a:extLst>
               <a:ext uri="{909E8E84-426E-40DD-AFC4-6F175D3DCCD1}">
-                <a14:hiddenFill xmlns:a14="http://schemas.microsoft.com/office/drawing/2010/main" xmlns="">
+                <a14:hiddenFill xmlns="" xmlns:a14="http://schemas.microsoft.com/office/drawing/2010/main">
                   <a:noFill/>
                 </a14:hiddenFill>
               </a:ext>
               <a:ext uri="{AF507438-7753-43E0-B8FC-AC1667EBCBE1}">
-                <a14:hiddenEffects xmlns:a14="http://schemas.microsoft.com/office/drawing/2010/main" xmlns="">
+                <a14:hiddenEffects xmlns="" xmlns:a14="http://schemas.microsoft.com/office/drawing/2010/main">
                   <a:effectLst>
                     <a:outerShdw dist="35921" dir="2700000" algn="ctr" rotWithShape="0">
                       <a:schemeClr val="bg2"/>
@@ -11757,12 +11757,12 @@
             <a:effectLst/>
             <a:extLst>
               <a:ext uri="{909E8E84-426E-40DD-AFC4-6F175D3DCCD1}">
-                <a14:hiddenFill xmlns:a14="http://schemas.microsoft.com/office/drawing/2010/main" xmlns="">
+                <a14:hiddenFill xmlns="" xmlns:a14="http://schemas.microsoft.com/office/drawing/2010/main">
                   <a:noFill/>
                 </a14:hiddenFill>
               </a:ext>
               <a:ext uri="{AF507438-7753-43E0-B8FC-AC1667EBCBE1}">
-                <a14:hiddenEffects xmlns:a14="http://schemas.microsoft.com/office/drawing/2010/main" xmlns="">
+                <a14:hiddenEffects xmlns="" xmlns:a14="http://schemas.microsoft.com/office/drawing/2010/main">
                   <a:effectLst>
                     <a:outerShdw dist="35921" dir="2700000" algn="ctr" rotWithShape="0">
                       <a:schemeClr val="bg2"/>
@@ -11825,12 +11825,12 @@
               <a:effectLst/>
               <a:extLst>
                 <a:ext uri="{909E8E84-426E-40DD-AFC4-6F175D3DCCD1}">
-                  <a14:hiddenFill xmlns:a14="http://schemas.microsoft.com/office/drawing/2010/main" xmlns="">
+                  <a14:hiddenFill xmlns="" xmlns:a14="http://schemas.microsoft.com/office/drawing/2010/main">
                     <a:noFill/>
                   </a14:hiddenFill>
                 </a:ext>
                 <a:ext uri="{AF507438-7753-43E0-B8FC-AC1667EBCBE1}">
-                  <a14:hiddenEffects xmlns:a14="http://schemas.microsoft.com/office/drawing/2010/main" xmlns="">
+                  <a14:hiddenEffects xmlns="" xmlns:a14="http://schemas.microsoft.com/office/drawing/2010/main">
                     <a:effectLst>
                       <a:outerShdw dist="35921" dir="2700000" algn="ctr" rotWithShape="0">
                         <a:schemeClr val="bg2"/>
@@ -11877,12 +11877,12 @@
               <a:effectLst/>
               <a:extLst>
                 <a:ext uri="{909E8E84-426E-40DD-AFC4-6F175D3DCCD1}">
-                  <a14:hiddenFill xmlns:a14="http://schemas.microsoft.com/office/drawing/2010/main" xmlns="">
+                  <a14:hiddenFill xmlns="" xmlns:a14="http://schemas.microsoft.com/office/drawing/2010/main">
                     <a:noFill/>
                   </a14:hiddenFill>
                 </a:ext>
                 <a:ext uri="{AF507438-7753-43E0-B8FC-AC1667EBCBE1}">
-                  <a14:hiddenEffects xmlns:a14="http://schemas.microsoft.com/office/drawing/2010/main" xmlns="">
+                  <a14:hiddenEffects xmlns="" xmlns:a14="http://schemas.microsoft.com/office/drawing/2010/main">
                     <a:effectLst>
                       <a:outerShdw dist="35921" dir="2700000" algn="ctr" rotWithShape="0">
                         <a:schemeClr val="bg2"/>
@@ -11930,12 +11930,12 @@
             <a:effectLst/>
             <a:extLst>
               <a:ext uri="{909E8E84-426E-40DD-AFC4-6F175D3DCCD1}">
-                <a14:hiddenFill xmlns:a14="http://schemas.microsoft.com/office/drawing/2010/main" xmlns="">
+                <a14:hiddenFill xmlns="" xmlns:a14="http://schemas.microsoft.com/office/drawing/2010/main">
                   <a:noFill/>
                 </a14:hiddenFill>
               </a:ext>
               <a:ext uri="{AF507438-7753-43E0-B8FC-AC1667EBCBE1}">
-                <a14:hiddenEffects xmlns:a14="http://schemas.microsoft.com/office/drawing/2010/main" xmlns="">
+                <a14:hiddenEffects xmlns="" xmlns:a14="http://schemas.microsoft.com/office/drawing/2010/main">
                   <a:effectLst>
                     <a:outerShdw dist="35921" dir="2700000" algn="ctr" rotWithShape="0">
                       <a:schemeClr val="bg2"/>
@@ -11998,12 +11998,12 @@
               <a:effectLst/>
               <a:extLst>
                 <a:ext uri="{909E8E84-426E-40DD-AFC4-6F175D3DCCD1}">
-                  <a14:hiddenFill xmlns:a14="http://schemas.microsoft.com/office/drawing/2010/main" xmlns="">
+                  <a14:hiddenFill xmlns="" xmlns:a14="http://schemas.microsoft.com/office/drawing/2010/main">
                     <a:noFill/>
                   </a14:hiddenFill>
                 </a:ext>
                 <a:ext uri="{AF507438-7753-43E0-B8FC-AC1667EBCBE1}">
-                  <a14:hiddenEffects xmlns:a14="http://schemas.microsoft.com/office/drawing/2010/main" xmlns="">
+                  <a14:hiddenEffects xmlns="" xmlns:a14="http://schemas.microsoft.com/office/drawing/2010/main">
                     <a:effectLst>
                       <a:outerShdw dist="35921" dir="2700000" algn="ctr" rotWithShape="0">
                         <a:schemeClr val="bg2"/>
@@ -12050,12 +12050,12 @@
               <a:effectLst/>
               <a:extLst>
                 <a:ext uri="{909E8E84-426E-40DD-AFC4-6F175D3DCCD1}">
-                  <a14:hiddenFill xmlns:a14="http://schemas.microsoft.com/office/drawing/2010/main" xmlns="">
+                  <a14:hiddenFill xmlns="" xmlns:a14="http://schemas.microsoft.com/office/drawing/2010/main">
                     <a:noFill/>
                   </a14:hiddenFill>
                 </a:ext>
                 <a:ext uri="{AF507438-7753-43E0-B8FC-AC1667EBCBE1}">
-                  <a14:hiddenEffects xmlns:a14="http://schemas.microsoft.com/office/drawing/2010/main" xmlns="">
+                  <a14:hiddenEffects xmlns="" xmlns:a14="http://schemas.microsoft.com/office/drawing/2010/main">
                     <a:effectLst>
                       <a:outerShdw dist="35921" dir="2700000" algn="ctr" rotWithShape="0">
                         <a:schemeClr val="bg2"/>
@@ -12103,12 +12103,12 @@
             <a:effectLst/>
             <a:extLst>
               <a:ext uri="{909E8E84-426E-40DD-AFC4-6F175D3DCCD1}">
-                <a14:hiddenFill xmlns:a14="http://schemas.microsoft.com/office/drawing/2010/main" xmlns="">
+                <a14:hiddenFill xmlns="" xmlns:a14="http://schemas.microsoft.com/office/drawing/2010/main">
                   <a:noFill/>
                 </a14:hiddenFill>
               </a:ext>
               <a:ext uri="{AF507438-7753-43E0-B8FC-AC1667EBCBE1}">
-                <a14:hiddenEffects xmlns:a14="http://schemas.microsoft.com/office/drawing/2010/main" xmlns="">
+                <a14:hiddenEffects xmlns="" xmlns:a14="http://schemas.microsoft.com/office/drawing/2010/main">
                   <a:effectLst>
                     <a:outerShdw dist="35921" dir="2700000" algn="ctr" rotWithShape="0">
                       <a:schemeClr val="bg2"/>
@@ -12155,12 +12155,12 @@
             <a:effectLst/>
             <a:extLst>
               <a:ext uri="{909E8E84-426E-40DD-AFC4-6F175D3DCCD1}">
-                <a14:hiddenFill xmlns:a14="http://schemas.microsoft.com/office/drawing/2010/main" xmlns="">
+                <a14:hiddenFill xmlns="" xmlns:a14="http://schemas.microsoft.com/office/drawing/2010/main">
                   <a:noFill/>
                 </a14:hiddenFill>
               </a:ext>
               <a:ext uri="{AF507438-7753-43E0-B8FC-AC1667EBCBE1}">
-                <a14:hiddenEffects xmlns:a14="http://schemas.microsoft.com/office/drawing/2010/main" xmlns="">
+                <a14:hiddenEffects xmlns="" xmlns:a14="http://schemas.microsoft.com/office/drawing/2010/main">
                   <a:effectLst>
                     <a:outerShdw dist="35921" dir="2700000" algn="ctr" rotWithShape="0">
                       <a:schemeClr val="bg2"/>
@@ -12207,12 +12207,12 @@
             <a:effectLst/>
             <a:extLst>
               <a:ext uri="{909E8E84-426E-40DD-AFC4-6F175D3DCCD1}">
-                <a14:hiddenFill xmlns:a14="http://schemas.microsoft.com/office/drawing/2010/main" xmlns="">
+                <a14:hiddenFill xmlns="" xmlns:a14="http://schemas.microsoft.com/office/drawing/2010/main">
                   <a:noFill/>
                 </a14:hiddenFill>
               </a:ext>
               <a:ext uri="{AF507438-7753-43E0-B8FC-AC1667EBCBE1}">
-                <a14:hiddenEffects xmlns:a14="http://schemas.microsoft.com/office/drawing/2010/main" xmlns="">
+                <a14:hiddenEffects xmlns="" xmlns:a14="http://schemas.microsoft.com/office/drawing/2010/main">
                   <a:effectLst>
                     <a:outerShdw dist="35921" dir="2700000" algn="ctr" rotWithShape="0">
                       <a:schemeClr val="bg2"/>
@@ -12259,12 +12259,12 @@
             <a:effectLst/>
             <a:extLst>
               <a:ext uri="{909E8E84-426E-40DD-AFC4-6F175D3DCCD1}">
-                <a14:hiddenFill xmlns:a14="http://schemas.microsoft.com/office/drawing/2010/main" xmlns="">
+                <a14:hiddenFill xmlns="" xmlns:a14="http://schemas.microsoft.com/office/drawing/2010/main">
                   <a:noFill/>
                 </a14:hiddenFill>
               </a:ext>
               <a:ext uri="{AF507438-7753-43E0-B8FC-AC1667EBCBE1}">
-                <a14:hiddenEffects xmlns:a14="http://schemas.microsoft.com/office/drawing/2010/main" xmlns="">
+                <a14:hiddenEffects xmlns="" xmlns:a14="http://schemas.microsoft.com/office/drawing/2010/main">
                   <a:effectLst>
                     <a:outerShdw dist="35921" dir="2700000" algn="ctr" rotWithShape="0">
                       <a:schemeClr val="bg2"/>
@@ -12327,12 +12327,12 @@
               <a:effectLst/>
               <a:extLst>
                 <a:ext uri="{909E8E84-426E-40DD-AFC4-6F175D3DCCD1}">
-                  <a14:hiddenFill xmlns:a14="http://schemas.microsoft.com/office/drawing/2010/main" xmlns="">
+                  <a14:hiddenFill xmlns="" xmlns:a14="http://schemas.microsoft.com/office/drawing/2010/main">
                     <a:noFill/>
                   </a14:hiddenFill>
                 </a:ext>
                 <a:ext uri="{AF507438-7753-43E0-B8FC-AC1667EBCBE1}">
-                  <a14:hiddenEffects xmlns:a14="http://schemas.microsoft.com/office/drawing/2010/main" xmlns="">
+                  <a14:hiddenEffects xmlns="" xmlns:a14="http://schemas.microsoft.com/office/drawing/2010/main">
                     <a:effectLst>
                       <a:outerShdw dist="35921" dir="2700000" algn="ctr" rotWithShape="0">
                         <a:schemeClr val="bg2"/>
@@ -12379,12 +12379,12 @@
               <a:effectLst/>
               <a:extLst>
                 <a:ext uri="{909E8E84-426E-40DD-AFC4-6F175D3DCCD1}">
-                  <a14:hiddenFill xmlns:a14="http://schemas.microsoft.com/office/drawing/2010/main" xmlns="">
+                  <a14:hiddenFill xmlns="" xmlns:a14="http://schemas.microsoft.com/office/drawing/2010/main">
                     <a:noFill/>
                   </a14:hiddenFill>
                 </a:ext>
                 <a:ext uri="{AF507438-7753-43E0-B8FC-AC1667EBCBE1}">
-                  <a14:hiddenEffects xmlns:a14="http://schemas.microsoft.com/office/drawing/2010/main" xmlns="">
+                  <a14:hiddenEffects xmlns="" xmlns:a14="http://schemas.microsoft.com/office/drawing/2010/main">
                     <a:effectLst>
                       <a:outerShdw dist="35921" dir="2700000" algn="ctr" rotWithShape="0">
                         <a:schemeClr val="bg2"/>
@@ -12407,7 +12407,7 @@
     </p:spTree>
     <p:extLst>
       <p:ext uri="{BB962C8B-B14F-4D97-AF65-F5344CB8AC3E}">
-        <p14:creationId xmlns:p14="http://schemas.microsoft.com/office/powerpoint/2010/main" xmlns="" val="1399673557"/>
+        <p14:creationId xmlns="" xmlns:p14="http://schemas.microsoft.com/office/powerpoint/2010/main" val="1399673557"/>
       </p:ext>
     </p:extLst>
   </p:cSld>
@@ -13131,11 +13131,7 @@
             <a:pPr eaLnBrk="1" hangingPunct="1"/>
             <a:r>
               <a:rPr lang="de-DE" dirty="0" smtClean="0"/>
-              <a:t>Thomas Goldschmidt, ABB Corporate </a:t>
-            </a:r>
-            <a:r>
-              <a:rPr lang="de-DE" dirty="0" smtClean="0"/>
-              <a:t>Research</a:t>
+              <a:t>Thomas Goldschmidt, ABB Corporate Research</a:t>
             </a:r>
           </a:p>
           <a:p>
@@ -13160,7 +13156,7 @@
           <a:blip r:embed="rId4" cstate="print">
             <a:extLst>
               <a:ext uri="{28A0092B-C50C-407E-A947-70E740481C1C}">
-                <a14:useLocalDpi xmlns:a14="http://schemas.microsoft.com/office/drawing/2010/main" xmlns="" val="0"/>
+                <a14:useLocalDpi xmlns="" xmlns:a14="http://schemas.microsoft.com/office/drawing/2010/main" val="0"/>
               </a:ext>
             </a:extLst>
           </a:blip>
@@ -13183,14 +13179,14 @@
           </a:ln>
           <a:extLst>
             <a:ext uri="{909E8E84-426E-40DD-AFC4-6F175D3DCCD1}">
-              <a14:hiddenFill xmlns:a14="http://schemas.microsoft.com/office/drawing/2010/main" xmlns="">
+              <a14:hiddenFill xmlns="" xmlns:a14="http://schemas.microsoft.com/office/drawing/2010/main">
                 <a:solidFill>
                   <a:srgbClr val="FFFFFF"/>
                 </a:solidFill>
               </a14:hiddenFill>
             </a:ext>
             <a:ext uri="{91240B29-F687-4F45-9708-019B960494DF}">
-              <a14:hiddenLine xmlns:a14="http://schemas.microsoft.com/office/drawing/2010/main" xmlns="" w="9525">
+              <a14:hiddenLine xmlns="" xmlns:a14="http://schemas.microsoft.com/office/drawing/2010/main" w="9525">
                 <a:solidFill>
                   <a:srgbClr val="000000"/>
                 </a:solidFill>
@@ -13214,7 +13210,7 @@
           <a:blip r:embed="rId5" cstate="print">
             <a:extLst>
               <a:ext uri="{28A0092B-C50C-407E-A947-70E740481C1C}">
-                <a14:useLocalDpi xmlns="" xmlns:a14="http://schemas.microsoft.com/office/drawing/2010/main" val="0"/>
+                <a14:useLocalDpi xmlns:a14="http://schemas.microsoft.com/office/drawing/2010/main" xmlns="" val="0"/>
               </a:ext>
             </a:extLst>
           </a:blip>
@@ -14287,7 +14283,7 @@
           <a:blip r:embed="rId2" cstate="print">
             <a:extLst>
               <a:ext uri="{28A0092B-C50C-407E-A947-70E740481C1C}">
-                <a14:useLocalDpi xmlns:a14="http://schemas.microsoft.com/office/drawing/2010/main" xmlns="" val="0"/>
+                <a14:useLocalDpi xmlns="" xmlns:a14="http://schemas.microsoft.com/office/drawing/2010/main" val="0"/>
               </a:ext>
             </a:extLst>
           </a:blip>
@@ -14307,7 +14303,7 @@
           <a:noFill/>
           <a:extLst>
             <a:ext uri="{909E8E84-426E-40DD-AFC4-6F175D3DCCD1}">
-              <a14:hiddenFill xmlns:a14="http://schemas.microsoft.com/office/drawing/2010/main" xmlns="">
+              <a14:hiddenFill xmlns="" xmlns:a14="http://schemas.microsoft.com/office/drawing/2010/main">
                 <a:solidFill>
                   <a:srgbClr val="FFFFFF"/>
                 </a:solidFill>
@@ -14347,13 +14343,8 @@
             </a:pPr>
             <a:r>
               <a:rPr lang="en-US" dirty="0" smtClean="0"/>
-              <a:t>© ABB </a:t>
-            </a:r>
-            <a:r>
-              <a:rPr lang="en-US" dirty="0" smtClean="0"/>
-              <a:t>Group, SAP AG </a:t>
-            </a:r>
-            <a:endParaRPr lang="en-US" dirty="0" smtClean="0"/>
+              <a:t>© ABB Group, SAP AG </a:t>
+            </a:r>
           </a:p>
           <a:p>
             <a:pPr>
@@ -14384,7 +14375,7 @@
     </p:spTree>
     <p:extLst>
       <p:ext uri="{BB962C8B-B14F-4D97-AF65-F5344CB8AC3E}">
-        <p14:creationId xmlns:p14="http://schemas.microsoft.com/office/powerpoint/2010/main" xmlns="" val="2883921127"/>
+        <p14:creationId xmlns="" xmlns:p14="http://schemas.microsoft.com/office/powerpoint/2010/main" val="2883921127"/>
       </p:ext>
     </p:extLst>
   </p:cSld>
@@ -15064,7 +15055,7 @@
           <a:blip r:embed="rId2" cstate="print">
             <a:extLst>
               <a:ext uri="{28A0092B-C50C-407E-A947-70E740481C1C}">
-                <a14:useLocalDpi xmlns:a14="http://schemas.microsoft.com/office/drawing/2010/main" xmlns="" val="0"/>
+                <a14:useLocalDpi xmlns="" xmlns:a14="http://schemas.microsoft.com/office/drawing/2010/main" val="0"/>
               </a:ext>
             </a:extLst>
           </a:blip>
@@ -15084,7 +15075,7 @@
           <a:noFill/>
           <a:extLst>
             <a:ext uri="{909E8E84-426E-40DD-AFC4-6F175D3DCCD1}">
-              <a14:hiddenFill xmlns:a14="http://schemas.microsoft.com/office/drawing/2010/main" xmlns="">
+              <a14:hiddenFill xmlns="" xmlns:a14="http://schemas.microsoft.com/office/drawing/2010/main">
                 <a:solidFill>
                   <a:srgbClr val="FFFFFF"/>
                 </a:solidFill>
@@ -15124,13 +15115,8 @@
             </a:pPr>
             <a:r>
               <a:rPr lang="en-US" dirty="0" smtClean="0"/>
-              <a:t>© ABB </a:t>
-            </a:r>
-            <a:r>
-              <a:rPr lang="en-US" dirty="0" smtClean="0"/>
-              <a:t>Group, SAP AG </a:t>
-            </a:r>
-            <a:endParaRPr lang="en-US" dirty="0" smtClean="0"/>
+              <a:t>© ABB Group, SAP AG </a:t>
+            </a:r>
           </a:p>
           <a:p>
             <a:pPr>
@@ -15161,7 +15147,7 @@
     </p:spTree>
     <p:extLst>
       <p:ext uri="{BB962C8B-B14F-4D97-AF65-F5344CB8AC3E}">
-        <p14:creationId xmlns:p14="http://schemas.microsoft.com/office/powerpoint/2010/main" xmlns="" val="3890995165"/>
+        <p14:creationId xmlns="" xmlns:p14="http://schemas.microsoft.com/office/powerpoint/2010/main" val="3890995165"/>
       </p:ext>
     </p:extLst>
   </p:cSld>
@@ -15763,13 +15749,8 @@
             </a:pPr>
             <a:r>
               <a:rPr lang="en-US" dirty="0" smtClean="0"/>
-              <a:t>© ABB </a:t>
-            </a:r>
-            <a:r>
-              <a:rPr lang="en-US" dirty="0" smtClean="0"/>
-              <a:t>Group, SAP AG </a:t>
-            </a:r>
-            <a:endParaRPr lang="en-US" dirty="0" smtClean="0"/>
+              <a:t>© ABB Group, SAP AG </a:t>
+            </a:r>
           </a:p>
           <a:p>
             <a:pPr>
@@ -15800,7 +15781,7 @@
     </p:spTree>
     <p:extLst>
       <p:ext uri="{BB962C8B-B14F-4D97-AF65-F5344CB8AC3E}">
-        <p14:creationId xmlns:p14="http://schemas.microsoft.com/office/powerpoint/2010/main" xmlns="" val="2361643444"/>
+        <p14:creationId xmlns="" xmlns:p14="http://schemas.microsoft.com/office/powerpoint/2010/main" val="2361643444"/>
       </p:ext>
     </p:extLst>
   </p:cSld>
@@ -15888,7 +15869,7 @@
           <a:blip r:embed="rId2" cstate="print">
             <a:extLst>
               <a:ext uri="{28A0092B-C50C-407E-A947-70E740481C1C}">
-                <a14:useLocalDpi xmlns:a14="http://schemas.microsoft.com/office/drawing/2010/main" xmlns="" val="0"/>
+                <a14:useLocalDpi xmlns="" xmlns:a14="http://schemas.microsoft.com/office/drawing/2010/main" val="0"/>
               </a:ext>
             </a:extLst>
           </a:blip>
@@ -15912,14 +15893,14 @@
           <a:effectLst/>
           <a:extLst>
             <a:ext uri="{909E8E84-426E-40DD-AFC4-6F175D3DCCD1}">
-              <a14:hiddenFill xmlns:a14="http://schemas.microsoft.com/office/drawing/2010/main" xmlns="">
+              <a14:hiddenFill xmlns="" xmlns:a14="http://schemas.microsoft.com/office/drawing/2010/main">
                 <a:solidFill>
                   <a:schemeClr val="accent1"/>
                 </a:solidFill>
               </a14:hiddenFill>
             </a:ext>
             <a:ext uri="{91240B29-F687-4F45-9708-019B960494DF}">
-              <a14:hiddenLine xmlns:a14="http://schemas.microsoft.com/office/drawing/2010/main" xmlns="" w="9525">
+              <a14:hiddenLine xmlns="" xmlns:a14="http://schemas.microsoft.com/office/drawing/2010/main" w="9525">
                 <a:solidFill>
                   <a:schemeClr val="tx1"/>
                 </a:solidFill>
@@ -15929,7 +15910,7 @@
               </a14:hiddenLine>
             </a:ext>
             <a:ext uri="{AF507438-7753-43E0-B8FC-AC1667EBCBE1}">
-              <a14:hiddenEffects xmlns:a14="http://schemas.microsoft.com/office/drawing/2010/main" xmlns="">
+              <a14:hiddenEffects xmlns="" xmlns:a14="http://schemas.microsoft.com/office/drawing/2010/main">
                 <a:effectLst>
                   <a:outerShdw dist="35921" dir="2700000" algn="ctr" rotWithShape="0">
                     <a:schemeClr val="bg2"/>
@@ -15971,13 +15952,8 @@
             </a:pPr>
             <a:r>
               <a:rPr lang="en-US" dirty="0" smtClean="0"/>
-              <a:t>© ABB </a:t>
-            </a:r>
-            <a:r>
-              <a:rPr lang="en-US" dirty="0" smtClean="0"/>
-              <a:t>Group, SAP AG </a:t>
-            </a:r>
-            <a:endParaRPr lang="en-US" dirty="0" smtClean="0"/>
+              <a:t>© ABB Group, SAP AG </a:t>
+            </a:r>
           </a:p>
           <a:p>
             <a:pPr>
@@ -16008,7 +15984,7 @@
     </p:spTree>
     <p:extLst>
       <p:ext uri="{BB962C8B-B14F-4D97-AF65-F5344CB8AC3E}">
-        <p14:creationId xmlns:p14="http://schemas.microsoft.com/office/powerpoint/2010/main" xmlns="" val="3356832792"/>
+        <p14:creationId xmlns="" xmlns:p14="http://schemas.microsoft.com/office/powerpoint/2010/main" val="3356832792"/>
       </p:ext>
     </p:extLst>
   </p:cSld>
@@ -16310,13 +16286,8 @@
             </a:pPr>
             <a:r>
               <a:rPr lang="en-US" dirty="0" smtClean="0"/>
-              <a:t>© ABB </a:t>
-            </a:r>
-            <a:r>
-              <a:rPr lang="en-US" dirty="0" smtClean="0"/>
-              <a:t>Group, SAP AG </a:t>
-            </a:r>
-            <a:endParaRPr lang="en-US" dirty="0" smtClean="0"/>
+              <a:t>© ABB Group, SAP AG </a:t>
+            </a:r>
           </a:p>
           <a:p>
             <a:pPr>
@@ -16347,7 +16318,7 @@
     </p:spTree>
     <p:extLst>
       <p:ext uri="{BB962C8B-B14F-4D97-AF65-F5344CB8AC3E}">
-        <p14:creationId xmlns:p14="http://schemas.microsoft.com/office/powerpoint/2010/main" xmlns="" val="1919947495"/>
+        <p14:creationId xmlns="" xmlns:p14="http://schemas.microsoft.com/office/powerpoint/2010/main" val="1919947495"/>
       </p:ext>
     </p:extLst>
   </p:cSld>
@@ -16847,7 +16818,7 @@
           <a:blip r:embed="rId3" cstate="print">
             <a:extLst>
               <a:ext uri="{28A0092B-C50C-407E-A947-70E740481C1C}">
-                <a14:useLocalDpi xmlns:a14="http://schemas.microsoft.com/office/drawing/2010/main" xmlns="" val="0"/>
+                <a14:useLocalDpi xmlns="" xmlns:a14="http://schemas.microsoft.com/office/drawing/2010/main" val="0"/>
               </a:ext>
             </a:extLst>
           </a:blip>
@@ -16871,14 +16842,14 @@
           <a:effectLst/>
           <a:extLst>
             <a:ext uri="{909E8E84-426E-40DD-AFC4-6F175D3DCCD1}">
-              <a14:hiddenFill xmlns:a14="http://schemas.microsoft.com/office/drawing/2010/main" xmlns="">
+              <a14:hiddenFill xmlns="" xmlns:a14="http://schemas.microsoft.com/office/drawing/2010/main">
                 <a:solidFill>
                   <a:schemeClr val="accent1"/>
                 </a:solidFill>
               </a14:hiddenFill>
             </a:ext>
             <a:ext uri="{91240B29-F687-4F45-9708-019B960494DF}">
-              <a14:hiddenLine xmlns:a14="http://schemas.microsoft.com/office/drawing/2010/main" xmlns="" w="9525">
+              <a14:hiddenLine xmlns="" xmlns:a14="http://schemas.microsoft.com/office/drawing/2010/main" w="9525">
                 <a:solidFill>
                   <a:schemeClr val="tx1"/>
                 </a:solidFill>
@@ -16888,7 +16859,7 @@
               </a14:hiddenLine>
             </a:ext>
             <a:ext uri="{AF507438-7753-43E0-B8FC-AC1667EBCBE1}">
-              <a14:hiddenEffects xmlns:a14="http://schemas.microsoft.com/office/drawing/2010/main" xmlns="">
+              <a14:hiddenEffects xmlns="" xmlns:a14="http://schemas.microsoft.com/office/drawing/2010/main">
                 <a:effectLst>
                   <a:outerShdw dist="35921" dir="2700000" algn="ctr" rotWithShape="0">
                     <a:schemeClr val="bg2"/>
@@ -16930,13 +16901,8 @@
             </a:pPr>
             <a:r>
               <a:rPr lang="en-US" dirty="0" smtClean="0"/>
-              <a:t>© ABB </a:t>
-            </a:r>
-            <a:r>
-              <a:rPr lang="en-US" dirty="0" smtClean="0"/>
-              <a:t>Group, SAP AG </a:t>
-            </a:r>
-            <a:endParaRPr lang="en-US" dirty="0" smtClean="0"/>
+              <a:t>© ABB Group, SAP AG </a:t>
+            </a:r>
           </a:p>
           <a:p>
             <a:pPr>
@@ -16967,7 +16933,7 @@
     </p:spTree>
     <p:extLst>
       <p:ext uri="{BB962C8B-B14F-4D97-AF65-F5344CB8AC3E}">
-        <p14:creationId xmlns:p14="http://schemas.microsoft.com/office/powerpoint/2010/main" xmlns="" val="3436060719"/>
+        <p14:creationId xmlns="" xmlns:p14="http://schemas.microsoft.com/office/powerpoint/2010/main" val="3436060719"/>
       </p:ext>
     </p:extLst>
   </p:cSld>
@@ -17185,52 +17151,26 @@
           <a:p>
             <a:pPr lvl="1"/>
             <a:r>
-              <a:rPr lang="de-DE" dirty="0" err="1"/>
-              <a:t>Git</a:t>
-            </a:r>
-            <a:r>
-              <a:rPr lang="de-DE" dirty="0"/>
-              <a:t> </a:t>
-            </a:r>
-            <a:r>
-              <a:rPr lang="de-DE" dirty="0" err="1"/>
-              <a:t>repository</a:t>
-            </a:r>
-            <a:r>
-              <a:rPr lang="de-DE" dirty="0"/>
-              <a:t>: </a:t>
-            </a:r>
-            <a:r>
-              <a:rPr lang="de-DE" dirty="0">
-                <a:hlinkClick r:id="rId2"/>
-              </a:rPr>
-              <a:t>https://</a:t>
-            </a:r>
-            <a:r>
-              <a:rPr lang="de-DE" dirty="0" smtClean="0">
-                <a:hlinkClick r:id="rId2"/>
-              </a:rPr>
-              <a:t>github.com/FURCAS-dev/FURCAS</a:t>
-            </a:r>
-            <a:endParaRPr lang="de-DE" dirty="0" smtClean="0"/>
+              <a:rPr lang="de-DE" dirty="0" smtClean="0"/>
+              <a:t>Indigo Update Site:</a:t>
+            </a:r>
+          </a:p>
+          <a:p>
+            <a:pPr lvl="2"/>
+            <a:r>
+              <a:rPr lang="en-US" dirty="0" smtClean="0"/>
+              <a:t>Modeling – OCL Examples and Editors</a:t>
+            </a:r>
           </a:p>
           <a:p>
             <a:pPr lvl="1"/>
             <a:r>
-              <a:rPr lang="de-DE" dirty="0"/>
-              <a:t>Setup Guide: </a:t>
-            </a:r>
-            <a:r>
-              <a:rPr lang="de-DE" dirty="0">
-                <a:hlinkClick r:id="rId3"/>
-              </a:rPr>
-              <a:t>http://</a:t>
-            </a:r>
-            <a:r>
-              <a:rPr lang="de-DE" dirty="0" smtClean="0">
-                <a:hlinkClick r:id="rId3"/>
-              </a:rPr>
-              <a:t>www.furcas.org/wiki</a:t>
+              <a:rPr lang="en-US" dirty="0" smtClean="0"/>
+              <a:t>Then see bundle </a:t>
+            </a:r>
+            <a:r>
+              <a:rPr lang="en-US" dirty="0" err="1" smtClean="0"/>
+              <a:t>org.eclipse.ocl.examples.impactanalyzer</a:t>
             </a:r>
             <a:endParaRPr lang="de-DE" dirty="0"/>
           </a:p>
@@ -17243,32 +17183,16 @@
           <a:p>
             <a:pPr lvl="1"/>
             <a:r>
-              <a:rPr lang="de-DE" dirty="0" err="1" smtClean="0"/>
-              <a:t>Submit</a:t>
-            </a:r>
-            <a:r>
-              <a:rPr lang="de-DE" dirty="0" smtClean="0"/>
-              <a:t> </a:t>
-            </a:r>
-            <a:r>
-              <a:rPr lang="de-DE" dirty="0" err="1" smtClean="0"/>
-              <a:t>to</a:t>
-            </a:r>
-            <a:r>
-              <a:rPr lang="de-DE" dirty="0" smtClean="0"/>
-              <a:t> </a:t>
-            </a:r>
-            <a:r>
-              <a:rPr lang="de-DE" dirty="0" err="1" smtClean="0"/>
-              <a:t>Eclipse</a:t>
-            </a:r>
-            <a:r>
-              <a:rPr lang="de-DE" dirty="0" smtClean="0"/>
-              <a:t> MDT </a:t>
-            </a:r>
-            <a:r>
-              <a:rPr lang="de-DE" dirty="0" err="1" smtClean="0"/>
-              <a:t>project</a:t>
+              <a:rPr lang="en-US" dirty="0" smtClean="0"/>
+              <a:t>Promote from examples/ to </a:t>
+            </a:r>
+            <a:r>
+              <a:rPr lang="en-US" dirty="0" err="1" smtClean="0"/>
+              <a:t>plugins</a:t>
+            </a:r>
+            <a:r>
+              <a:rPr lang="en-US" dirty="0" smtClean="0"/>
+              <a:t>/ after Eclipse Indigo</a:t>
             </a:r>
             <a:endParaRPr lang="de-DE" dirty="0" smtClean="0"/>
           </a:p>
@@ -17349,13 +17273,8 @@
             </a:pPr>
             <a:r>
               <a:rPr lang="en-US" dirty="0" smtClean="0"/>
-              <a:t>© ABB </a:t>
-            </a:r>
-            <a:r>
-              <a:rPr lang="en-US" dirty="0" smtClean="0"/>
-              <a:t>Group, SAP AG </a:t>
-            </a:r>
-            <a:endParaRPr lang="en-US" dirty="0" smtClean="0"/>
+              <a:t>© ABB Group, SAP AG </a:t>
+            </a:r>
           </a:p>
           <a:p>
             <a:pPr>
@@ -17386,7 +17305,7 @@
     </p:spTree>
     <p:extLst>
       <p:ext uri="{BB962C8B-B14F-4D97-AF65-F5344CB8AC3E}">
-        <p14:creationId xmlns:p14="http://schemas.microsoft.com/office/powerpoint/2010/main" xmlns="" val="1883989422"/>
+        <p14:creationId xmlns="" xmlns:p14="http://schemas.microsoft.com/office/powerpoint/2010/main" val="1883989422"/>
       </p:ext>
     </p:extLst>
   </p:cSld>
@@ -17524,13 +17443,8 @@
             </a:pPr>
             <a:r>
               <a:rPr lang="en-US" dirty="0" smtClean="0"/>
-              <a:t>© ABB </a:t>
-            </a:r>
-            <a:r>
-              <a:rPr lang="en-US" dirty="0" smtClean="0"/>
-              <a:t>Group, SAP AG </a:t>
-            </a:r>
-            <a:endParaRPr lang="en-US" dirty="0" smtClean="0"/>
+              <a:t>© ABB Group, SAP AG </a:t>
+            </a:r>
           </a:p>
           <a:p>
             <a:pPr>
@@ -17561,7 +17475,7 @@
     </p:spTree>
     <p:extLst>
       <p:ext uri="{BB962C8B-B14F-4D97-AF65-F5344CB8AC3E}">
-        <p14:creationId xmlns:p14="http://schemas.microsoft.com/office/powerpoint/2010/main" xmlns="" val="4190744108"/>
+        <p14:creationId xmlns="" xmlns:p14="http://schemas.microsoft.com/office/powerpoint/2010/main" val="4190744108"/>
       </p:ext>
     </p:extLst>
   </p:cSld>
@@ -17824,13 +17738,8 @@
             </a:pPr>
             <a:r>
               <a:rPr lang="en-US" dirty="0" smtClean="0"/>
-              <a:t>© ABB </a:t>
-            </a:r>
-            <a:r>
-              <a:rPr lang="en-US" dirty="0" smtClean="0"/>
-              <a:t>Group, SAP AG </a:t>
-            </a:r>
-            <a:endParaRPr lang="en-US" dirty="0" smtClean="0"/>
+              <a:t>© ABB Group, SAP AG </a:t>
+            </a:r>
           </a:p>
           <a:p>
             <a:pPr>
@@ -17870,7 +17779,7 @@
           <a:blip r:embed="rId2" cstate="print">
             <a:extLst>
               <a:ext uri="{28A0092B-C50C-407E-A947-70E740481C1C}">
-                <a14:useLocalDpi xmlns:a14="http://schemas.microsoft.com/office/drawing/2010/main" xmlns="" val="0"/>
+                <a14:useLocalDpi xmlns="" xmlns:a14="http://schemas.microsoft.com/office/drawing/2010/main" val="0"/>
               </a:ext>
             </a:extLst>
           </a:blip>
@@ -17894,14 +17803,14 @@
           <a:effectLst/>
           <a:extLst>
             <a:ext uri="{909E8E84-426E-40DD-AFC4-6F175D3DCCD1}">
-              <a14:hiddenFill xmlns:a14="http://schemas.microsoft.com/office/drawing/2010/main" xmlns="">
+              <a14:hiddenFill xmlns="" xmlns:a14="http://schemas.microsoft.com/office/drawing/2010/main">
                 <a:solidFill>
                   <a:schemeClr val="accent1"/>
                 </a:solidFill>
               </a14:hiddenFill>
             </a:ext>
             <a:ext uri="{91240B29-F687-4F45-9708-019B960494DF}">
-              <a14:hiddenLine xmlns:a14="http://schemas.microsoft.com/office/drawing/2010/main" xmlns="" w="9525">
+              <a14:hiddenLine xmlns="" xmlns:a14="http://schemas.microsoft.com/office/drawing/2010/main" w="9525">
                 <a:solidFill>
                   <a:schemeClr val="tx1"/>
                 </a:solidFill>
@@ -17911,7 +17820,7 @@
               </a14:hiddenLine>
             </a:ext>
             <a:ext uri="{AF507438-7753-43E0-B8FC-AC1667EBCBE1}">
-              <a14:hiddenEffects xmlns:a14="http://schemas.microsoft.com/office/drawing/2010/main" xmlns="">
+              <a14:hiddenEffects xmlns="" xmlns:a14="http://schemas.microsoft.com/office/drawing/2010/main">
                 <a:effectLst>
                   <a:outerShdw dist="35921" dir="2700000" algn="ctr" rotWithShape="0">
                     <a:schemeClr val="bg2"/>
@@ -17941,7 +17850,7 @@
             </a:duotone>
             <a:extLst>
               <a:ext uri="{28A0092B-C50C-407E-A947-70E740481C1C}">
-                <a14:useLocalDpi xmlns:a14="http://schemas.microsoft.com/office/drawing/2010/main" xmlns="" val="0"/>
+                <a14:useLocalDpi xmlns="" xmlns:a14="http://schemas.microsoft.com/office/drawing/2010/main" val="0"/>
               </a:ext>
             </a:extLst>
           </a:blip>
@@ -17965,14 +17874,14 @@
           <a:effectLst/>
           <a:extLst>
             <a:ext uri="{909E8E84-426E-40DD-AFC4-6F175D3DCCD1}">
-              <a14:hiddenFill xmlns:a14="http://schemas.microsoft.com/office/drawing/2010/main" xmlns="">
+              <a14:hiddenFill xmlns="" xmlns:a14="http://schemas.microsoft.com/office/drawing/2010/main">
                 <a:solidFill>
                   <a:schemeClr val="accent1"/>
                 </a:solidFill>
               </a14:hiddenFill>
             </a:ext>
             <a:ext uri="{91240B29-F687-4F45-9708-019B960494DF}">
-              <a14:hiddenLine xmlns:a14="http://schemas.microsoft.com/office/drawing/2010/main" xmlns="" w="9525">
+              <a14:hiddenLine xmlns="" xmlns:a14="http://schemas.microsoft.com/office/drawing/2010/main" w="9525">
                 <a:solidFill>
                   <a:schemeClr val="tx1"/>
                 </a:solidFill>
@@ -17982,7 +17891,7 @@
               </a14:hiddenLine>
             </a:ext>
             <a:ext uri="{AF507438-7753-43E0-B8FC-AC1667EBCBE1}">
-              <a14:hiddenEffects xmlns:a14="http://schemas.microsoft.com/office/drawing/2010/main" xmlns="">
+              <a14:hiddenEffects xmlns="" xmlns:a14="http://schemas.microsoft.com/office/drawing/2010/main">
                 <a:effectLst>
                   <a:outerShdw dist="35921" dir="2700000" algn="ctr" rotWithShape="0">
                     <a:schemeClr val="bg2"/>
@@ -18098,7 +18007,7 @@
           <a:effectLst/>
           <a:extLst>
             <a:ext uri="{AF507438-7753-43E0-B8FC-AC1667EBCBE1}">
-              <a14:hiddenEffects xmlns:a14="http://schemas.microsoft.com/office/drawing/2010/main" xmlns="">
+              <a14:hiddenEffects xmlns="" xmlns:a14="http://schemas.microsoft.com/office/drawing/2010/main">
                 <a:effectLst>
                   <a:outerShdw dist="35921" dir="2700000" algn="ctr" rotWithShape="0">
                     <a:schemeClr val="bg2"/>
@@ -18267,7 +18176,7 @@
     </p:spTree>
     <p:extLst>
       <p:ext uri="{BB962C8B-B14F-4D97-AF65-F5344CB8AC3E}">
-        <p14:creationId xmlns:p14="http://schemas.microsoft.com/office/powerpoint/2010/main" xmlns="" val="2623419530"/>
+        <p14:creationId xmlns="" xmlns:p14="http://schemas.microsoft.com/office/powerpoint/2010/main" val="2623419530"/>
       </p:ext>
     </p:extLst>
   </p:cSld>
@@ -18666,7 +18575,7 @@
           <a:blip r:embed="rId2" cstate="print">
             <a:extLst>
               <a:ext uri="{28A0092B-C50C-407E-A947-70E740481C1C}">
-                <a14:useLocalDpi xmlns:a14="http://schemas.microsoft.com/office/drawing/2010/main" xmlns="" val="0"/>
+                <a14:useLocalDpi xmlns="" xmlns:a14="http://schemas.microsoft.com/office/drawing/2010/main" val="0"/>
               </a:ext>
             </a:extLst>
           </a:blip>
@@ -18732,13 +18641,8 @@
             </a:pPr>
             <a:r>
               <a:rPr lang="en-US" dirty="0" smtClean="0"/>
-              <a:t>© ABB </a:t>
-            </a:r>
-            <a:r>
-              <a:rPr lang="en-US" dirty="0" smtClean="0"/>
-              <a:t>Group, SAP AG </a:t>
-            </a:r>
-            <a:endParaRPr lang="en-US" dirty="0" smtClean="0"/>
+              <a:t>© ABB Group, SAP AG </a:t>
+            </a:r>
           </a:p>
           <a:p>
             <a:pPr>
@@ -18769,7 +18673,7 @@
     </p:spTree>
     <p:extLst>
       <p:ext uri="{BB962C8B-B14F-4D97-AF65-F5344CB8AC3E}">
-        <p14:creationId xmlns:p14="http://schemas.microsoft.com/office/powerpoint/2010/main" xmlns="" val="1487266994"/>
+        <p14:creationId xmlns="" xmlns:p14="http://schemas.microsoft.com/office/powerpoint/2010/main" val="1487266994"/>
       </p:ext>
     </p:extLst>
   </p:cSld>
@@ -18934,13 +18838,8 @@
             </a:pPr>
             <a:r>
               <a:rPr lang="en-US" dirty="0" smtClean="0"/>
-              <a:t>© ABB </a:t>
-            </a:r>
-            <a:r>
-              <a:rPr lang="en-US" dirty="0" smtClean="0"/>
-              <a:t>Group, SAP AG </a:t>
-            </a:r>
-            <a:endParaRPr lang="en-US" dirty="0" smtClean="0"/>
+              <a:t>© ABB Group, SAP AG </a:t>
+            </a:r>
           </a:p>
           <a:p>
             <a:pPr>
@@ -19036,7 +18935,7 @@
             <p:ph idx="1"/>
             <p:extLst>
               <p:ext uri="{D42A27DB-BD31-4B8C-83A1-F6EECF244321}">
-                <p14:modId xmlns:p14="http://schemas.microsoft.com/office/powerpoint/2010/main" xmlns="" val="3936538456"/>
+                <p14:modId xmlns="" xmlns:p14="http://schemas.microsoft.com/office/powerpoint/2010/main" val="3936538456"/>
               </p:ext>
             </p:extLst>
           </p:nvPr>
@@ -19141,13 +19040,8 @@
             </a:pPr>
             <a:r>
               <a:rPr lang="en-US" dirty="0" smtClean="0"/>
-              <a:t>© ABB </a:t>
-            </a:r>
-            <a:r>
-              <a:rPr lang="en-US" dirty="0" smtClean="0"/>
-              <a:t>Group, SAP AG </a:t>
-            </a:r>
-            <a:endParaRPr lang="en-US" dirty="0" smtClean="0"/>
+              <a:t>© ABB Group, SAP AG </a:t>
+            </a:r>
           </a:p>
           <a:p>
             <a:pPr>
@@ -19178,7 +19072,7 @@
     </p:spTree>
     <p:extLst>
       <p:ext uri="{BB962C8B-B14F-4D97-AF65-F5344CB8AC3E}">
-        <p14:creationId xmlns:p14="http://schemas.microsoft.com/office/powerpoint/2010/main" xmlns="" val="388148564"/>
+        <p14:creationId xmlns="" xmlns:p14="http://schemas.microsoft.com/office/powerpoint/2010/main" val="388148564"/>
       </p:ext>
     </p:extLst>
   </p:cSld>
@@ -19255,7 +19149,7 @@
           <a:blip r:embed="rId2" cstate="print">
             <a:extLst>
               <a:ext uri="{28A0092B-C50C-407E-A947-70E740481C1C}">
-                <a14:useLocalDpi xmlns:a14="http://schemas.microsoft.com/office/drawing/2010/main" xmlns="" val="0"/>
+                <a14:useLocalDpi xmlns="" xmlns:a14="http://schemas.microsoft.com/office/drawing/2010/main" val="0"/>
               </a:ext>
             </a:extLst>
           </a:blip>
@@ -19279,14 +19173,14 @@
           <a:effectLst/>
           <a:extLst>
             <a:ext uri="{909E8E84-426E-40DD-AFC4-6F175D3DCCD1}">
-              <a14:hiddenFill xmlns:a14="http://schemas.microsoft.com/office/drawing/2010/main" xmlns="">
+              <a14:hiddenFill xmlns="" xmlns:a14="http://schemas.microsoft.com/office/drawing/2010/main">
                 <a:solidFill>
                   <a:schemeClr val="accent1"/>
                 </a:solidFill>
               </a14:hiddenFill>
             </a:ext>
             <a:ext uri="{91240B29-F687-4F45-9708-019B960494DF}">
-              <a14:hiddenLine xmlns:a14="http://schemas.microsoft.com/office/drawing/2010/main" xmlns="" w="9525">
+              <a14:hiddenLine xmlns="" xmlns:a14="http://schemas.microsoft.com/office/drawing/2010/main" w="9525">
                 <a:solidFill>
                   <a:schemeClr val="tx1"/>
                 </a:solidFill>
@@ -19296,7 +19190,7 @@
               </a14:hiddenLine>
             </a:ext>
             <a:ext uri="{AF507438-7753-43E0-B8FC-AC1667EBCBE1}">
-              <a14:hiddenEffects xmlns:a14="http://schemas.microsoft.com/office/drawing/2010/main" xmlns="">
+              <a14:hiddenEffects xmlns="" xmlns:a14="http://schemas.microsoft.com/office/drawing/2010/main">
                 <a:effectLst>
                   <a:outerShdw dist="35921" dir="2700000" algn="ctr" rotWithShape="0">
                     <a:schemeClr val="bg2"/>
@@ -19319,7 +19213,7 @@
           <a:blip r:embed="rId3" cstate="print">
             <a:extLst>
               <a:ext uri="{28A0092B-C50C-407E-A947-70E740481C1C}">
-                <a14:useLocalDpi xmlns:a14="http://schemas.microsoft.com/office/drawing/2010/main" xmlns="" val="0"/>
+                <a14:useLocalDpi xmlns="" xmlns:a14="http://schemas.microsoft.com/office/drawing/2010/main" val="0"/>
               </a:ext>
             </a:extLst>
           </a:blip>
@@ -19343,14 +19237,14 @@
           <a:effectLst/>
           <a:extLst>
             <a:ext uri="{909E8E84-426E-40DD-AFC4-6F175D3DCCD1}">
-              <a14:hiddenFill xmlns:a14="http://schemas.microsoft.com/office/drawing/2010/main" xmlns="">
+              <a14:hiddenFill xmlns="" xmlns:a14="http://schemas.microsoft.com/office/drawing/2010/main">
                 <a:solidFill>
                   <a:schemeClr val="accent1"/>
                 </a:solidFill>
               </a14:hiddenFill>
             </a:ext>
             <a:ext uri="{91240B29-F687-4F45-9708-019B960494DF}">
-              <a14:hiddenLine xmlns:a14="http://schemas.microsoft.com/office/drawing/2010/main" xmlns="" w="9525">
+              <a14:hiddenLine xmlns="" xmlns:a14="http://schemas.microsoft.com/office/drawing/2010/main" w="9525">
                 <a:solidFill>
                   <a:schemeClr val="tx1"/>
                 </a:solidFill>
@@ -19360,7 +19254,7 @@
               </a14:hiddenLine>
             </a:ext>
             <a:ext uri="{AF507438-7753-43E0-B8FC-AC1667EBCBE1}">
-              <a14:hiddenEffects xmlns:a14="http://schemas.microsoft.com/office/drawing/2010/main" xmlns="">
+              <a14:hiddenEffects xmlns="" xmlns:a14="http://schemas.microsoft.com/office/drawing/2010/main">
                 <a:effectLst>
                   <a:outerShdw dist="35921" dir="2700000" algn="ctr" rotWithShape="0">
                     <a:schemeClr val="bg2"/>
@@ -19453,7 +19347,7 @@
           <a:blip r:embed="rId4" cstate="print">
             <a:extLst>
               <a:ext uri="{28A0092B-C50C-407E-A947-70E740481C1C}">
-                <a14:useLocalDpi xmlns:a14="http://schemas.microsoft.com/office/drawing/2010/main" xmlns="" val="0"/>
+                <a14:useLocalDpi xmlns="" xmlns:a14="http://schemas.microsoft.com/office/drawing/2010/main" val="0"/>
               </a:ext>
             </a:extLst>
           </a:blip>
@@ -19477,14 +19371,14 @@
           <a:effectLst/>
           <a:extLst>
             <a:ext uri="{909E8E84-426E-40DD-AFC4-6F175D3DCCD1}">
-              <a14:hiddenFill xmlns:a14="http://schemas.microsoft.com/office/drawing/2010/main" xmlns="">
+              <a14:hiddenFill xmlns="" xmlns:a14="http://schemas.microsoft.com/office/drawing/2010/main">
                 <a:solidFill>
                   <a:schemeClr val="accent1"/>
                 </a:solidFill>
               </a14:hiddenFill>
             </a:ext>
             <a:ext uri="{91240B29-F687-4F45-9708-019B960494DF}">
-              <a14:hiddenLine xmlns:a14="http://schemas.microsoft.com/office/drawing/2010/main" xmlns="" w="9525">
+              <a14:hiddenLine xmlns="" xmlns:a14="http://schemas.microsoft.com/office/drawing/2010/main" w="9525">
                 <a:solidFill>
                   <a:schemeClr val="tx1"/>
                 </a:solidFill>
@@ -19494,7 +19388,7 @@
               </a14:hiddenLine>
             </a:ext>
             <a:ext uri="{AF507438-7753-43E0-B8FC-AC1667EBCBE1}">
-              <a14:hiddenEffects xmlns:a14="http://schemas.microsoft.com/office/drawing/2010/main" xmlns="">
+              <a14:hiddenEffects xmlns="" xmlns:a14="http://schemas.microsoft.com/office/drawing/2010/main">
                 <a:effectLst>
                   <a:outerShdw dist="35921" dir="2700000" algn="ctr" rotWithShape="0">
                     <a:schemeClr val="bg2"/>
@@ -19517,7 +19411,7 @@
           <a:blip r:embed="rId5" cstate="print">
             <a:extLst>
               <a:ext uri="{28A0092B-C50C-407E-A947-70E740481C1C}">
-                <a14:useLocalDpi xmlns:a14="http://schemas.microsoft.com/office/drawing/2010/main" xmlns="" val="0"/>
+                <a14:useLocalDpi xmlns="" xmlns:a14="http://schemas.microsoft.com/office/drawing/2010/main" val="0"/>
               </a:ext>
             </a:extLst>
           </a:blip>
@@ -19541,14 +19435,14 @@
           <a:effectLst/>
           <a:extLst>
             <a:ext uri="{909E8E84-426E-40DD-AFC4-6F175D3DCCD1}">
-              <a14:hiddenFill xmlns:a14="http://schemas.microsoft.com/office/drawing/2010/main" xmlns="">
+              <a14:hiddenFill xmlns="" xmlns:a14="http://schemas.microsoft.com/office/drawing/2010/main">
                 <a:solidFill>
                   <a:schemeClr val="accent1"/>
                 </a:solidFill>
               </a14:hiddenFill>
             </a:ext>
             <a:ext uri="{91240B29-F687-4F45-9708-019B960494DF}">
-              <a14:hiddenLine xmlns:a14="http://schemas.microsoft.com/office/drawing/2010/main" xmlns="" w="9525">
+              <a14:hiddenLine xmlns="" xmlns:a14="http://schemas.microsoft.com/office/drawing/2010/main" w="9525">
                 <a:solidFill>
                   <a:schemeClr val="tx1"/>
                 </a:solidFill>
@@ -19558,7 +19452,7 @@
               </a14:hiddenLine>
             </a:ext>
             <a:ext uri="{AF507438-7753-43E0-B8FC-AC1667EBCBE1}">
-              <a14:hiddenEffects xmlns:a14="http://schemas.microsoft.com/office/drawing/2010/main" xmlns="">
+              <a14:hiddenEffects xmlns="" xmlns:a14="http://schemas.microsoft.com/office/drawing/2010/main">
                 <a:effectLst>
                   <a:outerShdw dist="35921" dir="2700000" algn="ctr" rotWithShape="0">
                     <a:schemeClr val="bg2"/>
@@ -19581,7 +19475,7 @@
           <a:blip r:embed="rId6" cstate="print">
             <a:extLst>
               <a:ext uri="{28A0092B-C50C-407E-A947-70E740481C1C}">
-                <a14:useLocalDpi xmlns:a14="http://schemas.microsoft.com/office/drawing/2010/main" xmlns="" val="0"/>
+                <a14:useLocalDpi xmlns="" xmlns:a14="http://schemas.microsoft.com/office/drawing/2010/main" val="0"/>
               </a:ext>
             </a:extLst>
           </a:blip>
@@ -19601,7 +19495,7 @@
           <a:noFill/>
           <a:extLst>
             <a:ext uri="{909E8E84-426E-40DD-AFC4-6F175D3DCCD1}">
-              <a14:hiddenFill xmlns:a14="http://schemas.microsoft.com/office/drawing/2010/main" xmlns="">
+              <a14:hiddenFill xmlns="" xmlns:a14="http://schemas.microsoft.com/office/drawing/2010/main">
                 <a:solidFill>
                   <a:srgbClr val="FFFFFF"/>
                 </a:solidFill>
@@ -19622,7 +19516,7 @@
           <a:blip r:embed="rId6" cstate="print">
             <a:extLst>
               <a:ext uri="{28A0092B-C50C-407E-A947-70E740481C1C}">
-                <a14:useLocalDpi xmlns:a14="http://schemas.microsoft.com/office/drawing/2010/main" xmlns="" val="0"/>
+                <a14:useLocalDpi xmlns="" xmlns:a14="http://schemas.microsoft.com/office/drawing/2010/main" val="0"/>
               </a:ext>
             </a:extLst>
           </a:blip>
@@ -19642,7 +19536,7 @@
           <a:noFill/>
           <a:extLst>
             <a:ext uri="{909E8E84-426E-40DD-AFC4-6F175D3DCCD1}">
-              <a14:hiddenFill xmlns:a14="http://schemas.microsoft.com/office/drawing/2010/main" xmlns="">
+              <a14:hiddenFill xmlns="" xmlns:a14="http://schemas.microsoft.com/office/drawing/2010/main">
                 <a:solidFill>
                   <a:srgbClr val="FFFFFF"/>
                 </a:solidFill>
@@ -19663,7 +19557,7 @@
           <a:blip r:embed="rId7" cstate="print">
             <a:extLst>
               <a:ext uri="{28A0092B-C50C-407E-A947-70E740481C1C}">
-                <a14:useLocalDpi xmlns:a14="http://schemas.microsoft.com/office/drawing/2010/main" xmlns="" val="0"/>
+                <a14:useLocalDpi xmlns="" xmlns:a14="http://schemas.microsoft.com/office/drawing/2010/main" val="0"/>
               </a:ext>
             </a:extLst>
           </a:blip>
@@ -19683,7 +19577,7 @@
           <a:noFill/>
           <a:extLst>
             <a:ext uri="{909E8E84-426E-40DD-AFC4-6F175D3DCCD1}">
-              <a14:hiddenFill xmlns:a14="http://schemas.microsoft.com/office/drawing/2010/main" xmlns="">
+              <a14:hiddenFill xmlns="" xmlns:a14="http://schemas.microsoft.com/office/drawing/2010/main">
                 <a:solidFill>
                   <a:srgbClr val="FFFFFF"/>
                 </a:solidFill>
@@ -19723,13 +19617,8 @@
             </a:pPr>
             <a:r>
               <a:rPr lang="en-US" dirty="0" smtClean="0"/>
-              <a:t>© ABB </a:t>
-            </a:r>
-            <a:r>
-              <a:rPr lang="en-US" dirty="0" smtClean="0"/>
-              <a:t>Group, SAP AG </a:t>
-            </a:r>
-            <a:endParaRPr lang="en-US" dirty="0" smtClean="0"/>
+              <a:t>© ABB Group, SAP AG </a:t>
+            </a:r>
           </a:p>
           <a:p>
             <a:pPr>
@@ -19760,7 +19649,7 @@
     </p:spTree>
     <p:extLst>
       <p:ext uri="{BB962C8B-B14F-4D97-AF65-F5344CB8AC3E}">
-        <p14:creationId xmlns:p14="http://schemas.microsoft.com/office/powerpoint/2010/main" xmlns="" val="3074039359"/>
+        <p14:creationId xmlns="" xmlns:p14="http://schemas.microsoft.com/office/powerpoint/2010/main" val="3074039359"/>
       </p:ext>
     </p:extLst>
   </p:cSld>
@@ -20400,7 +20289,7 @@
             </a:duotone>
             <a:extLst>
               <a:ext uri="{28A0092B-C50C-407E-A947-70E740481C1C}">
-                <a14:useLocalDpi xmlns:a14="http://schemas.microsoft.com/office/drawing/2010/main" xmlns="" val="0"/>
+                <a14:useLocalDpi xmlns="" xmlns:a14="http://schemas.microsoft.com/office/drawing/2010/main" val="0"/>
               </a:ext>
             </a:extLst>
           </a:blip>
@@ -20420,7 +20309,7 @@
           <a:noFill/>
           <a:extLst>
             <a:ext uri="{909E8E84-426E-40DD-AFC4-6F175D3DCCD1}">
-              <a14:hiddenFill xmlns:a14="http://schemas.microsoft.com/office/drawing/2010/main" xmlns="">
+              <a14:hiddenFill xmlns="" xmlns:a14="http://schemas.microsoft.com/office/drawing/2010/main">
                 <a:solidFill>
                   <a:srgbClr val="FFFFFF"/>
                 </a:solidFill>
@@ -20460,13 +20349,8 @@
             </a:pPr>
             <a:r>
               <a:rPr lang="en-US" dirty="0" smtClean="0"/>
-              <a:t>© ABB </a:t>
-            </a:r>
-            <a:r>
-              <a:rPr lang="en-US" dirty="0" smtClean="0"/>
-              <a:t>Group, SAP AG </a:t>
-            </a:r>
-            <a:endParaRPr lang="en-US" dirty="0" smtClean="0"/>
+              <a:t>© ABB Group, SAP AG </a:t>
+            </a:r>
           </a:p>
           <a:p>
             <a:pPr>
@@ -20497,7 +20381,7 @@
     </p:spTree>
     <p:extLst>
       <p:ext uri="{BB962C8B-B14F-4D97-AF65-F5344CB8AC3E}">
-        <p14:creationId xmlns:p14="http://schemas.microsoft.com/office/powerpoint/2010/main" xmlns="" val="1978441398"/>
+        <p14:creationId xmlns="" xmlns:p14="http://schemas.microsoft.com/office/powerpoint/2010/main" val="1978441398"/>
       </p:ext>
     </p:extLst>
   </p:cSld>
@@ -21078,7 +20962,7 @@
           <a:effectLst/>
           <a:extLst>
             <a:ext uri="{AF507438-7753-43E0-B8FC-AC1667EBCBE1}">
-              <a14:hiddenEffects xmlns:a14="http://schemas.microsoft.com/office/drawing/2010/main" xmlns="">
+              <a14:hiddenEffects xmlns="" xmlns:a14="http://schemas.microsoft.com/office/drawing/2010/main">
                 <a:effectLst>
                   <a:outerShdw dist="35921" dir="2700000" algn="ctr" rotWithShape="0">
                     <a:schemeClr val="bg2"/>
@@ -21168,7 +21052,7 @@
           <a:effectLst/>
           <a:extLst>
             <a:ext uri="{AF507438-7753-43E0-B8FC-AC1667EBCBE1}">
-              <a14:hiddenEffects xmlns:a14="http://schemas.microsoft.com/office/drawing/2010/main" xmlns="">
+              <a14:hiddenEffects xmlns="" xmlns:a14="http://schemas.microsoft.com/office/drawing/2010/main">
                 <a:effectLst>
                   <a:outerShdw dist="35921" dir="2700000" algn="ctr" rotWithShape="0">
                     <a:schemeClr val="bg2"/>
@@ -21258,7 +21142,7 @@
           <a:effectLst/>
           <a:extLst>
             <a:ext uri="{AF507438-7753-43E0-B8FC-AC1667EBCBE1}">
-              <a14:hiddenEffects xmlns:a14="http://schemas.microsoft.com/office/drawing/2010/main" xmlns="">
+              <a14:hiddenEffects xmlns="" xmlns:a14="http://schemas.microsoft.com/office/drawing/2010/main">
                 <a:effectLst>
                   <a:outerShdw dist="35921" dir="2700000" algn="ctr" rotWithShape="0">
                     <a:schemeClr val="bg2"/>
@@ -21348,7 +21232,7 @@
           <a:effectLst/>
           <a:extLst>
             <a:ext uri="{AF507438-7753-43E0-B8FC-AC1667EBCBE1}">
-              <a14:hiddenEffects xmlns:a14="http://schemas.microsoft.com/office/drawing/2010/main" xmlns="">
+              <a14:hiddenEffects xmlns="" xmlns:a14="http://schemas.microsoft.com/office/drawing/2010/main">
                 <a:effectLst>
                   <a:outerShdw dist="35921" dir="2700000" algn="ctr" rotWithShape="0">
                     <a:schemeClr val="bg2"/>
@@ -21438,7 +21322,7 @@
           <a:effectLst/>
           <a:extLst>
             <a:ext uri="{AF507438-7753-43E0-B8FC-AC1667EBCBE1}">
-              <a14:hiddenEffects xmlns:a14="http://schemas.microsoft.com/office/drawing/2010/main" xmlns="">
+              <a14:hiddenEffects xmlns="" xmlns:a14="http://schemas.microsoft.com/office/drawing/2010/main">
                 <a:effectLst>
                   <a:outerShdw dist="35921" dir="2700000" algn="ctr" rotWithShape="0">
                     <a:schemeClr val="bg2"/>
@@ -21544,7 +21428,7 @@
           <a:effectLst/>
           <a:extLst>
             <a:ext uri="{AF507438-7753-43E0-B8FC-AC1667EBCBE1}">
-              <a14:hiddenEffects xmlns:a14="http://schemas.microsoft.com/office/drawing/2010/main" xmlns="">
+              <a14:hiddenEffects xmlns="" xmlns:a14="http://schemas.microsoft.com/office/drawing/2010/main">
                 <a:effectLst>
                   <a:outerShdw dist="35921" dir="2700000" algn="ctr" rotWithShape="0">
                     <a:schemeClr val="bg2"/>
@@ -21587,7 +21471,7 @@
           <a:effectLst/>
           <a:extLst>
             <a:ext uri="{AF507438-7753-43E0-B8FC-AC1667EBCBE1}">
-              <a14:hiddenEffects xmlns:a14="http://schemas.microsoft.com/office/drawing/2010/main" xmlns="">
+              <a14:hiddenEffects xmlns="" xmlns:a14="http://schemas.microsoft.com/office/drawing/2010/main">
                 <a:effectLst>
                   <a:outerShdw dist="35921" dir="2700000" algn="ctr" rotWithShape="0">
                     <a:schemeClr val="bg2"/>
@@ -21630,7 +21514,7 @@
           <a:effectLst/>
           <a:extLst>
             <a:ext uri="{AF507438-7753-43E0-B8FC-AC1667EBCBE1}">
-              <a14:hiddenEffects xmlns:a14="http://schemas.microsoft.com/office/drawing/2010/main" xmlns="">
+              <a14:hiddenEffects xmlns="" xmlns:a14="http://schemas.microsoft.com/office/drawing/2010/main">
                 <a:effectLst>
                   <a:outerShdw dist="35921" dir="2700000" algn="ctr" rotWithShape="0">
                     <a:schemeClr val="bg2"/>
@@ -21673,7 +21557,7 @@
           <a:effectLst/>
           <a:extLst>
             <a:ext uri="{AF507438-7753-43E0-B8FC-AC1667EBCBE1}">
-              <a14:hiddenEffects xmlns:a14="http://schemas.microsoft.com/office/drawing/2010/main" xmlns="">
+              <a14:hiddenEffects xmlns="" xmlns:a14="http://schemas.microsoft.com/office/drawing/2010/main">
                 <a:effectLst>
                   <a:outerShdw dist="35921" dir="2700000" algn="ctr" rotWithShape="0">
                     <a:schemeClr val="bg2"/>
@@ -22041,13 +21925,8 @@
             </a:pPr>
             <a:r>
               <a:rPr lang="en-US" dirty="0" smtClean="0"/>
-              <a:t>© ABB </a:t>
-            </a:r>
-            <a:r>
-              <a:rPr lang="en-US" dirty="0" smtClean="0"/>
-              <a:t>Group, SAP AG </a:t>
-            </a:r>
-            <a:endParaRPr lang="en-US" dirty="0" smtClean="0"/>
+              <a:t>© ABB Group, SAP AG </a:t>
+            </a:r>
           </a:p>
           <a:p>
             <a:pPr>
@@ -22078,7 +21957,7 @@
     </p:spTree>
     <p:extLst>
       <p:ext uri="{BB962C8B-B14F-4D97-AF65-F5344CB8AC3E}">
-        <p14:creationId xmlns:p14="http://schemas.microsoft.com/office/powerpoint/2010/main" xmlns="" val="2812851005"/>
+        <p14:creationId xmlns="" xmlns:p14="http://schemas.microsoft.com/office/powerpoint/2010/main" val="2812851005"/>
       </p:ext>
     </p:extLst>
   </p:cSld>
@@ -22881,7 +22760,7 @@
           <a:blip r:embed="rId2" cstate="print">
             <a:extLst>
               <a:ext uri="{28A0092B-C50C-407E-A947-70E740481C1C}">
-                <a14:useLocalDpi xmlns:a14="http://schemas.microsoft.com/office/drawing/2010/main" xmlns="" val="0"/>
+                <a14:useLocalDpi xmlns="" xmlns:a14="http://schemas.microsoft.com/office/drawing/2010/main" val="0"/>
               </a:ext>
             </a:extLst>
           </a:blip>
@@ -22901,7 +22780,7 @@
           <a:noFill/>
           <a:extLst>
             <a:ext uri="{909E8E84-426E-40DD-AFC4-6F175D3DCCD1}">
-              <a14:hiddenFill xmlns:a14="http://schemas.microsoft.com/office/drawing/2010/main" xmlns="">
+              <a14:hiddenFill xmlns="" xmlns:a14="http://schemas.microsoft.com/office/drawing/2010/main">
                 <a:solidFill>
                   <a:srgbClr val="FFFFFF"/>
                 </a:solidFill>
@@ -22982,13 +22861,8 @@
             </a:pPr>
             <a:r>
               <a:rPr lang="en-US" dirty="0" smtClean="0"/>
-              <a:t>© ABB </a:t>
-            </a:r>
-            <a:r>
-              <a:rPr lang="en-US" dirty="0" smtClean="0"/>
-              <a:t>Group, SAP AG </a:t>
-            </a:r>
-            <a:endParaRPr lang="en-US" dirty="0" smtClean="0"/>
+              <a:t>© ABB Group, SAP AG </a:t>
+            </a:r>
           </a:p>
           <a:p>
             <a:pPr>
@@ -23019,7 +22893,7 @@
     </p:spTree>
     <p:extLst>
       <p:ext uri="{BB962C8B-B14F-4D97-AF65-F5344CB8AC3E}">
-        <p14:creationId xmlns:p14="http://schemas.microsoft.com/office/powerpoint/2010/main" xmlns="" val="356159477"/>
+        <p14:creationId xmlns="" xmlns:p14="http://schemas.microsoft.com/office/powerpoint/2010/main" val="356159477"/>
       </p:ext>
     </p:extLst>
   </p:cSld>
@@ -23322,7 +23196,7 @@
         <a:effectLst/>
         <a:extLst>
           <a:ext uri="{AF507438-7753-43E0-B8FC-AC1667EBCBE1}">
-            <a14:hiddenEffects xmlns:a14="http://schemas.microsoft.com/office/drawing/2010/main" xmlns="">
+            <a14:hiddenEffects xmlns="" xmlns:a14="http://schemas.microsoft.com/office/drawing/2010/main">
               <a:effectLst>
                 <a:outerShdw dist="35921" dir="2700000" algn="ctr" rotWithShape="0">
                   <a:schemeClr val="bg2"/>
@@ -23397,7 +23271,7 @@
         <a:effectLst/>
         <a:extLst>
           <a:ext uri="{AF507438-7753-43E0-B8FC-AC1667EBCBE1}">
-            <a14:hiddenEffects xmlns:a14="http://schemas.microsoft.com/office/drawing/2010/main" xmlns="">
+            <a14:hiddenEffects xmlns="" xmlns:a14="http://schemas.microsoft.com/office/drawing/2010/main">
               <a:effectLst>
                 <a:outerShdw dist="35921" dir="2700000" algn="ctr" rotWithShape="0">
                   <a:schemeClr val="bg2"/>
@@ -23863,7 +23737,7 @@
         <a:effectLst/>
         <a:extLst>
           <a:ext uri="{AF507438-7753-43E0-B8FC-AC1667EBCBE1}">
-            <a14:hiddenEffects xmlns:a14="http://schemas.microsoft.com/office/drawing/2010/main" xmlns="">
+            <a14:hiddenEffects xmlns="" xmlns:a14="http://schemas.microsoft.com/office/drawing/2010/main">
               <a:effectLst>
                 <a:outerShdw dist="35921" dir="2700000" algn="ctr" rotWithShape="0">
                   <a:schemeClr val="bg2"/>
@@ -23938,7 +23812,7 @@
         <a:effectLst/>
         <a:extLst>
           <a:ext uri="{AF507438-7753-43E0-B8FC-AC1667EBCBE1}">
-            <a14:hiddenEffects xmlns:a14="http://schemas.microsoft.com/office/drawing/2010/main" xmlns="">
+            <a14:hiddenEffects xmlns="" xmlns:a14="http://schemas.microsoft.com/office/drawing/2010/main">
               <a:effectLst>
                 <a:outerShdw dist="35921" dir="2700000" algn="ctr" rotWithShape="0">
                   <a:schemeClr val="bg2"/>

</xml_diff>